<commit_message>
presentation slides modified based on feedback
</commit_message>
<xml_diff>
--- a/doc/yilong_xu_presentation.pptx
+++ b/doc/yilong_xu_presentation.pptx
@@ -5,20 +5,21 @@
     <p:sldMasterId id="2147483648" r:id="rId1"/>
   </p:sldMasterIdLst>
   <p:notesMasterIdLst>
-    <p:notesMasterId r:id="rId13"/>
+    <p:notesMasterId r:id="rId14"/>
   </p:notesMasterIdLst>
   <p:sldIdLst>
     <p:sldId id="256" r:id="rId2"/>
-    <p:sldId id="257" r:id="rId3"/>
-    <p:sldId id="258" r:id="rId4"/>
-    <p:sldId id="259" r:id="rId5"/>
-    <p:sldId id="261" r:id="rId6"/>
-    <p:sldId id="264" r:id="rId7"/>
-    <p:sldId id="265" r:id="rId8"/>
-    <p:sldId id="266" r:id="rId9"/>
-    <p:sldId id="267" r:id="rId10"/>
-    <p:sldId id="269" r:id="rId11"/>
-    <p:sldId id="270" r:id="rId12"/>
+    <p:sldId id="272" r:id="rId3"/>
+    <p:sldId id="257" r:id="rId4"/>
+    <p:sldId id="258" r:id="rId5"/>
+    <p:sldId id="259" r:id="rId6"/>
+    <p:sldId id="261" r:id="rId7"/>
+    <p:sldId id="264" r:id="rId8"/>
+    <p:sldId id="265" r:id="rId9"/>
+    <p:sldId id="266" r:id="rId10"/>
+    <p:sldId id="267" r:id="rId11"/>
+    <p:sldId id="269" r:id="rId12"/>
+    <p:sldId id="270" r:id="rId13"/>
   </p:sldIdLst>
   <p:sldSz cx="12192000" cy="6858000"/>
   <p:notesSz cx="6858000" cy="9144000"/>
@@ -207,7 +208,7 @@
           <a:p>
             <a:fld id="{79CF2B7B-EB9E-45D2-BD9E-75F14DE39450}" type="datetimeFigureOut">
               <a:rPr lang="zh-CN" altLang="en-US" smtClean="0"/>
-              <a:t>2025/11/25</a:t>
+              <a:t>2025/12/6</a:t>
             </a:fld>
             <a:endParaRPr lang="zh-CN" altLang="en-US"/>
           </a:p>
@@ -518,6 +519,90 @@
           <a:bodyPr/>
           <a:lstStyle/>
           <a:p>
+            <a:endParaRPr lang="zh-CN" altLang="en-US" dirty="0"/>
+          </a:p>
+        </p:txBody>
+      </p:sp>
+      <p:sp>
+        <p:nvSpPr>
+          <p:cNvPr id="4" name="灯片编号占位符 3"/>
+          <p:cNvSpPr>
+            <a:spLocks noGrp="1"/>
+          </p:cNvSpPr>
+          <p:nvPr>
+            <p:ph type="sldNum" sz="quarter" idx="5"/>
+          </p:nvPr>
+        </p:nvSpPr>
+        <p:spPr/>
+        <p:txBody>
+          <a:bodyPr/>
+          <a:lstStyle/>
+          <a:p>
+            <a:fld id="{1E315603-6302-462E-8E91-DFD805EE5743}" type="slidenum">
+              <a:rPr lang="zh-CN" altLang="en-US" smtClean="0"/>
+              <a:t>4</a:t>
+            </a:fld>
+            <a:endParaRPr lang="zh-CN" altLang="en-US"/>
+          </a:p>
+        </p:txBody>
+      </p:sp>
+    </p:spTree>
+    <p:extLst>
+      <p:ext uri="{BB962C8B-B14F-4D97-AF65-F5344CB8AC3E}">
+        <p14:creationId xmlns:p14="http://schemas.microsoft.com/office/powerpoint/2010/main" val="3843385512"/>
+      </p:ext>
+    </p:extLst>
+  </p:cSld>
+  <p:clrMapOvr>
+    <a:masterClrMapping/>
+  </p:clrMapOvr>
+</p:notes>
+</file>
+
+<file path=ppt/notesSlides/notesSlide2.xml><?xml version="1.0" encoding="utf-8"?>
+<p:notes xmlns:a="http://schemas.openxmlformats.org/drawingml/2006/main" xmlns:r="http://schemas.openxmlformats.org/officeDocument/2006/relationships" xmlns:p="http://schemas.openxmlformats.org/presentationml/2006/main">
+  <p:cSld>
+    <p:spTree>
+      <p:nvGrpSpPr>
+        <p:cNvPr id="1" name=""/>
+        <p:cNvGrpSpPr/>
+        <p:nvPr/>
+      </p:nvGrpSpPr>
+      <p:grpSpPr>
+        <a:xfrm>
+          <a:off x="0" y="0"/>
+          <a:ext cx="0" cy="0"/>
+          <a:chOff x="0" y="0"/>
+          <a:chExt cx="0" cy="0"/>
+        </a:xfrm>
+      </p:grpSpPr>
+      <p:sp>
+        <p:nvSpPr>
+          <p:cNvPr id="2" name="幻灯片图像占位符 1"/>
+          <p:cNvSpPr>
+            <a:spLocks noGrp="1" noRot="1" noChangeAspect="1"/>
+          </p:cNvSpPr>
+          <p:nvPr>
+            <p:ph type="sldImg"/>
+          </p:nvPr>
+        </p:nvSpPr>
+        <p:spPr/>
+      </p:sp>
+      <p:sp>
+        <p:nvSpPr>
+          <p:cNvPr id="3" name="备注占位符 2"/>
+          <p:cNvSpPr>
+            <a:spLocks noGrp="1"/>
+          </p:cNvSpPr>
+          <p:nvPr>
+            <p:ph type="body" idx="1"/>
+          </p:nvPr>
+        </p:nvSpPr>
+        <p:spPr/>
+        <p:txBody>
+          <a:bodyPr/>
+          <a:lstStyle/>
+          <a:p>
             <a:r>
               <a:rPr lang="en-US" altLang="zh-CN" b="1" dirty="0"/>
               <a:t>California (CA): mild positive relationship, warmer years slightly increase corn yield.</a:t>
@@ -585,7 +670,7 @@
           <a:p>
             <a:fld id="{1E315603-6302-462E-8E91-DFD805EE5743}" type="slidenum">
               <a:rPr lang="zh-CN" altLang="en-US" smtClean="0"/>
-              <a:t>5</a:t>
+              <a:t>6</a:t>
             </a:fld>
             <a:endParaRPr lang="zh-CN" altLang="en-US"/>
           </a:p>
@@ -604,7 +689,7 @@
 </p:notes>
 </file>
 
-<file path=ppt/notesSlides/notesSlide2.xml><?xml version="1.0" encoding="utf-8"?>
+<file path=ppt/notesSlides/notesSlide3.xml><?xml version="1.0" encoding="utf-8"?>
 <p:notes xmlns:a="http://schemas.openxmlformats.org/drawingml/2006/main" xmlns:r="http://schemas.openxmlformats.org/officeDocument/2006/relationships" xmlns:p="http://schemas.openxmlformats.org/presentationml/2006/main">
   <p:cSld>
     <p:spTree>
@@ -708,7 +793,7 @@
           <a:p>
             <a:fld id="{1E315603-6302-462E-8E91-DFD805EE5743}" type="slidenum">
               <a:rPr lang="zh-CN" altLang="en-US" smtClean="0"/>
-              <a:t>6</a:t>
+              <a:t>7</a:t>
             </a:fld>
             <a:endParaRPr lang="zh-CN" altLang="en-US"/>
           </a:p>
@@ -727,7 +812,7 @@
 </p:notes>
 </file>
 
-<file path=ppt/notesSlides/notesSlide3.xml><?xml version="1.0" encoding="utf-8"?>
+<file path=ppt/notesSlides/notesSlide4.xml><?xml version="1.0" encoding="utf-8"?>
 <p:notes xmlns:a="http://schemas.openxmlformats.org/drawingml/2006/main" xmlns:r="http://schemas.openxmlformats.org/officeDocument/2006/relationships" xmlns:p="http://schemas.openxmlformats.org/presentationml/2006/main">
   <p:cSld>
     <p:spTree>
@@ -816,7 +901,7 @@
           <a:p>
             <a:fld id="{1E315603-6302-462E-8E91-DFD805EE5743}" type="slidenum">
               <a:rPr lang="zh-CN" altLang="en-US" smtClean="0"/>
-              <a:t>7</a:t>
+              <a:t>8</a:t>
             </a:fld>
             <a:endParaRPr lang="zh-CN" altLang="en-US"/>
           </a:p>
@@ -835,7 +920,7 @@
 </p:notes>
 </file>
 
-<file path=ppt/notesSlides/notesSlide4.xml><?xml version="1.0" encoding="utf-8"?>
+<file path=ppt/notesSlides/notesSlide5.xml><?xml version="1.0" encoding="utf-8"?>
 <p:notes xmlns:a="http://schemas.openxmlformats.org/drawingml/2006/main" xmlns:r="http://schemas.openxmlformats.org/officeDocument/2006/relationships" xmlns:p="http://schemas.openxmlformats.org/presentationml/2006/main">
   <p:cSld>
     <p:spTree>
@@ -924,7 +1009,7 @@
           <a:p>
             <a:fld id="{1E315603-6302-462E-8E91-DFD805EE5743}" type="slidenum">
               <a:rPr lang="zh-CN" altLang="en-US" smtClean="0"/>
-              <a:t>8</a:t>
+              <a:t>9</a:t>
             </a:fld>
             <a:endParaRPr lang="zh-CN" altLang="en-US"/>
           </a:p>
@@ -934,90 +1019,6 @@
     <p:extLst>
       <p:ext uri="{BB962C8B-B14F-4D97-AF65-F5344CB8AC3E}">
         <p14:creationId xmlns:p14="http://schemas.microsoft.com/office/powerpoint/2010/main" val="1055710852"/>
-      </p:ext>
-    </p:extLst>
-  </p:cSld>
-  <p:clrMapOvr>
-    <a:masterClrMapping/>
-  </p:clrMapOvr>
-</p:notes>
-</file>
-
-<file path=ppt/notesSlides/notesSlide5.xml><?xml version="1.0" encoding="utf-8"?>
-<p:notes xmlns:a="http://schemas.openxmlformats.org/drawingml/2006/main" xmlns:r="http://schemas.openxmlformats.org/officeDocument/2006/relationships" xmlns:p="http://schemas.openxmlformats.org/presentationml/2006/main">
-  <p:cSld>
-    <p:spTree>
-      <p:nvGrpSpPr>
-        <p:cNvPr id="1" name=""/>
-        <p:cNvGrpSpPr/>
-        <p:nvPr/>
-      </p:nvGrpSpPr>
-      <p:grpSpPr>
-        <a:xfrm>
-          <a:off x="0" y="0"/>
-          <a:ext cx="0" cy="0"/>
-          <a:chOff x="0" y="0"/>
-          <a:chExt cx="0" cy="0"/>
-        </a:xfrm>
-      </p:grpSpPr>
-      <p:sp>
-        <p:nvSpPr>
-          <p:cNvPr id="2" name="幻灯片图像占位符 1"/>
-          <p:cNvSpPr>
-            <a:spLocks noGrp="1" noRot="1" noChangeAspect="1"/>
-          </p:cNvSpPr>
-          <p:nvPr>
-            <p:ph type="sldImg"/>
-          </p:nvPr>
-        </p:nvSpPr>
-        <p:spPr/>
-      </p:sp>
-      <p:sp>
-        <p:nvSpPr>
-          <p:cNvPr id="3" name="备注占位符 2"/>
-          <p:cNvSpPr>
-            <a:spLocks noGrp="1"/>
-          </p:cNvSpPr>
-          <p:nvPr>
-            <p:ph type="body" idx="1"/>
-          </p:nvPr>
-        </p:nvSpPr>
-        <p:spPr/>
-        <p:txBody>
-          <a:bodyPr/>
-          <a:lstStyle/>
-          <a:p>
-            <a:endParaRPr lang="zh-CN" altLang="en-US" dirty="0"/>
-          </a:p>
-        </p:txBody>
-      </p:sp>
-      <p:sp>
-        <p:nvSpPr>
-          <p:cNvPr id="4" name="灯片编号占位符 3"/>
-          <p:cNvSpPr>
-            <a:spLocks noGrp="1"/>
-          </p:cNvSpPr>
-          <p:nvPr>
-            <p:ph type="sldNum" sz="quarter" idx="5"/>
-          </p:nvPr>
-        </p:nvSpPr>
-        <p:spPr/>
-        <p:txBody>
-          <a:bodyPr/>
-          <a:lstStyle/>
-          <a:p>
-            <a:fld id="{1E315603-6302-462E-8E91-DFD805EE5743}" type="slidenum">
-              <a:rPr lang="zh-CN" altLang="en-US" smtClean="0"/>
-              <a:t>9</a:t>
-            </a:fld>
-            <a:endParaRPr lang="zh-CN" altLang="en-US"/>
-          </a:p>
-        </p:txBody>
-      </p:sp>
-    </p:spTree>
-    <p:extLst>
-      <p:ext uri="{BB962C8B-B14F-4D97-AF65-F5344CB8AC3E}">
-        <p14:creationId xmlns:p14="http://schemas.microsoft.com/office/powerpoint/2010/main" val="323011743"/>
       </p:ext>
     </p:extLst>
   </p:cSld>
@@ -1093,6 +1094,90 @@
             <a:fld id="{1E315603-6302-462E-8E91-DFD805EE5743}" type="slidenum">
               <a:rPr lang="zh-CN" altLang="en-US" smtClean="0"/>
               <a:t>10</a:t>
+            </a:fld>
+            <a:endParaRPr lang="zh-CN" altLang="en-US"/>
+          </a:p>
+        </p:txBody>
+      </p:sp>
+    </p:spTree>
+    <p:extLst>
+      <p:ext uri="{BB962C8B-B14F-4D97-AF65-F5344CB8AC3E}">
+        <p14:creationId xmlns:p14="http://schemas.microsoft.com/office/powerpoint/2010/main" val="323011743"/>
+      </p:ext>
+    </p:extLst>
+  </p:cSld>
+  <p:clrMapOvr>
+    <a:masterClrMapping/>
+  </p:clrMapOvr>
+</p:notes>
+</file>
+
+<file path=ppt/notesSlides/notesSlide7.xml><?xml version="1.0" encoding="utf-8"?>
+<p:notes xmlns:a="http://schemas.openxmlformats.org/drawingml/2006/main" xmlns:r="http://schemas.openxmlformats.org/officeDocument/2006/relationships" xmlns:p="http://schemas.openxmlformats.org/presentationml/2006/main">
+  <p:cSld>
+    <p:spTree>
+      <p:nvGrpSpPr>
+        <p:cNvPr id="1" name=""/>
+        <p:cNvGrpSpPr/>
+        <p:nvPr/>
+      </p:nvGrpSpPr>
+      <p:grpSpPr>
+        <a:xfrm>
+          <a:off x="0" y="0"/>
+          <a:ext cx="0" cy="0"/>
+          <a:chOff x="0" y="0"/>
+          <a:chExt cx="0" cy="0"/>
+        </a:xfrm>
+      </p:grpSpPr>
+      <p:sp>
+        <p:nvSpPr>
+          <p:cNvPr id="2" name="幻灯片图像占位符 1"/>
+          <p:cNvSpPr>
+            <a:spLocks noGrp="1" noRot="1" noChangeAspect="1"/>
+          </p:cNvSpPr>
+          <p:nvPr>
+            <p:ph type="sldImg"/>
+          </p:nvPr>
+        </p:nvSpPr>
+        <p:spPr/>
+      </p:sp>
+      <p:sp>
+        <p:nvSpPr>
+          <p:cNvPr id="3" name="备注占位符 2"/>
+          <p:cNvSpPr>
+            <a:spLocks noGrp="1"/>
+          </p:cNvSpPr>
+          <p:nvPr>
+            <p:ph type="body" idx="1"/>
+          </p:nvPr>
+        </p:nvSpPr>
+        <p:spPr/>
+        <p:txBody>
+          <a:bodyPr/>
+          <a:lstStyle/>
+          <a:p>
+            <a:endParaRPr lang="zh-CN" altLang="en-US" dirty="0"/>
+          </a:p>
+        </p:txBody>
+      </p:sp>
+      <p:sp>
+        <p:nvSpPr>
+          <p:cNvPr id="4" name="灯片编号占位符 3"/>
+          <p:cNvSpPr>
+            <a:spLocks noGrp="1"/>
+          </p:cNvSpPr>
+          <p:nvPr>
+            <p:ph type="sldNum" sz="quarter" idx="5"/>
+          </p:nvPr>
+        </p:nvSpPr>
+        <p:spPr/>
+        <p:txBody>
+          <a:bodyPr/>
+          <a:lstStyle/>
+          <a:p>
+            <a:fld id="{1E315603-6302-462E-8E91-DFD805EE5743}" type="slidenum">
+              <a:rPr lang="zh-CN" altLang="en-US" smtClean="0"/>
+              <a:t>11</a:t>
             </a:fld>
             <a:endParaRPr lang="zh-CN" altLang="en-US"/>
           </a:p>
@@ -1258,7 +1343,7 @@
           <a:p>
             <a:fld id="{3DF8167B-1E00-487E-BB0D-11FC18BEAF23}" type="datetimeFigureOut">
               <a:rPr lang="zh-CN" altLang="en-US" smtClean="0"/>
-              <a:t>2025/11/25</a:t>
+              <a:t>2025/12/6</a:t>
             </a:fld>
             <a:endParaRPr lang="zh-CN" altLang="en-US"/>
           </a:p>
@@ -1456,7 +1541,7 @@
           <a:p>
             <a:fld id="{3DF8167B-1E00-487E-BB0D-11FC18BEAF23}" type="datetimeFigureOut">
               <a:rPr lang="zh-CN" altLang="en-US" smtClean="0"/>
-              <a:t>2025/11/25</a:t>
+              <a:t>2025/12/6</a:t>
             </a:fld>
             <a:endParaRPr lang="zh-CN" altLang="en-US"/>
           </a:p>
@@ -1664,7 +1749,7 @@
           <a:p>
             <a:fld id="{3DF8167B-1E00-487E-BB0D-11FC18BEAF23}" type="datetimeFigureOut">
               <a:rPr lang="zh-CN" altLang="en-US" smtClean="0"/>
-              <a:t>2025/11/25</a:t>
+              <a:t>2025/12/6</a:t>
             </a:fld>
             <a:endParaRPr lang="zh-CN" altLang="en-US"/>
           </a:p>
@@ -1862,7 +1947,7 @@
           <a:p>
             <a:fld id="{3DF8167B-1E00-487E-BB0D-11FC18BEAF23}" type="datetimeFigureOut">
               <a:rPr lang="zh-CN" altLang="en-US" smtClean="0"/>
-              <a:t>2025/11/25</a:t>
+              <a:t>2025/12/6</a:t>
             </a:fld>
             <a:endParaRPr lang="zh-CN" altLang="en-US"/>
           </a:p>
@@ -2137,7 +2222,7 @@
           <a:p>
             <a:fld id="{3DF8167B-1E00-487E-BB0D-11FC18BEAF23}" type="datetimeFigureOut">
               <a:rPr lang="zh-CN" altLang="en-US" smtClean="0"/>
-              <a:t>2025/11/25</a:t>
+              <a:t>2025/12/6</a:t>
             </a:fld>
             <a:endParaRPr lang="zh-CN" altLang="en-US"/>
           </a:p>
@@ -2402,7 +2487,7 @@
           <a:p>
             <a:fld id="{3DF8167B-1E00-487E-BB0D-11FC18BEAF23}" type="datetimeFigureOut">
               <a:rPr lang="zh-CN" altLang="en-US" smtClean="0"/>
-              <a:t>2025/11/25</a:t>
+              <a:t>2025/12/6</a:t>
             </a:fld>
             <a:endParaRPr lang="zh-CN" altLang="en-US"/>
           </a:p>
@@ -2814,7 +2899,7 @@
           <a:p>
             <a:fld id="{3DF8167B-1E00-487E-BB0D-11FC18BEAF23}" type="datetimeFigureOut">
               <a:rPr lang="zh-CN" altLang="en-US" smtClean="0"/>
-              <a:t>2025/11/25</a:t>
+              <a:t>2025/12/6</a:t>
             </a:fld>
             <a:endParaRPr lang="zh-CN" altLang="en-US"/>
           </a:p>
@@ -2955,7 +3040,7 @@
           <a:p>
             <a:fld id="{3DF8167B-1E00-487E-BB0D-11FC18BEAF23}" type="datetimeFigureOut">
               <a:rPr lang="zh-CN" altLang="en-US" smtClean="0"/>
-              <a:t>2025/11/25</a:t>
+              <a:t>2025/12/6</a:t>
             </a:fld>
             <a:endParaRPr lang="zh-CN" altLang="en-US"/>
           </a:p>
@@ -3068,7 +3153,7 @@
           <a:p>
             <a:fld id="{3DF8167B-1E00-487E-BB0D-11FC18BEAF23}" type="datetimeFigureOut">
               <a:rPr lang="zh-CN" altLang="en-US" smtClean="0"/>
-              <a:t>2025/11/25</a:t>
+              <a:t>2025/12/6</a:t>
             </a:fld>
             <a:endParaRPr lang="zh-CN" altLang="en-US"/>
           </a:p>
@@ -3379,7 +3464,7 @@
           <a:p>
             <a:fld id="{3DF8167B-1E00-487E-BB0D-11FC18BEAF23}" type="datetimeFigureOut">
               <a:rPr lang="zh-CN" altLang="en-US" smtClean="0"/>
-              <a:t>2025/11/25</a:t>
+              <a:t>2025/12/6</a:t>
             </a:fld>
             <a:endParaRPr lang="zh-CN" altLang="en-US"/>
           </a:p>
@@ -3667,7 +3752,7 @@
           <a:p>
             <a:fld id="{3DF8167B-1E00-487E-BB0D-11FC18BEAF23}" type="datetimeFigureOut">
               <a:rPr lang="zh-CN" altLang="en-US" smtClean="0"/>
-              <a:t>2025/11/25</a:t>
+              <a:t>2025/12/6</a:t>
             </a:fld>
             <a:endParaRPr lang="zh-CN" altLang="en-US"/>
           </a:p>
@@ -3908,7 +3993,7 @@
           <a:p>
             <a:fld id="{3DF8167B-1E00-487E-BB0D-11FC18BEAF23}" type="datetimeFigureOut">
               <a:rPr lang="zh-CN" altLang="en-US" smtClean="0"/>
-              <a:t>2025/11/25</a:t>
+              <a:t>2025/12/6</a:t>
             </a:fld>
             <a:endParaRPr lang="zh-CN" altLang="en-US"/>
           </a:p>
@@ -4425,6 +4510,376 @@
     </p:bg>
     <p:spTree>
       <p:nvGrpSpPr>
+        <p:cNvPr id="1" name=""/>
+        <p:cNvGrpSpPr/>
+        <p:nvPr/>
+      </p:nvGrpSpPr>
+      <p:grpSpPr>
+        <a:xfrm>
+          <a:off x="0" y="0"/>
+          <a:ext cx="0" cy="0"/>
+          <a:chOff x="0" y="0"/>
+          <a:chExt cx="0" cy="0"/>
+        </a:xfrm>
+      </p:grpSpPr>
+      <p:sp useBgFill="1">
+        <p:nvSpPr>
+          <p:cNvPr id="26" name="Rectangle 25">
+            <a:extLst>
+              <a:ext uri="{FF2B5EF4-FFF2-40B4-BE49-F238E27FC236}">
+                <a16:creationId xmlns:a16="http://schemas.microsoft.com/office/drawing/2014/main" id="{0B9EE3F3-89B7-43C3-8651-C4C96830993D}"/>
+              </a:ext>
+              <a:ext uri="{C183D7F6-B498-43B3-948B-1728B52AA6E4}">
+                <adec:decorative xmlns:adec="http://schemas.microsoft.com/office/drawing/2017/decorative" val="1"/>
+              </a:ext>
+            </a:extLst>
+          </p:cNvPr>
+          <p:cNvSpPr>
+            <a:spLocks noGrp="1" noRot="1" noChangeAspect="1" noMove="1" noResize="1" noEditPoints="1" noAdjustHandles="1" noChangeArrowheads="1" noChangeShapeType="1" noTextEdit="1"/>
+          </p:cNvSpPr>
+          <p:nvPr>
+            <p:extLst>
+              <p:ext uri="{386F3935-93C4-4BCD-93E2-E3B085C9AB24}">
+                <p16:designElem xmlns:p16="http://schemas.microsoft.com/office/powerpoint/2015/main" val="1"/>
+              </p:ext>
+            </p:extLst>
+          </p:nvPr>
+        </p:nvSpPr>
+        <p:spPr>
+          <a:xfrm>
+            <a:off x="0" y="0"/>
+            <a:ext cx="12192000" cy="6858000"/>
+          </a:xfrm>
+          <a:prstGeom prst="rect">
+            <a:avLst/>
+          </a:prstGeom>
+          <a:ln>
+            <a:noFill/>
+          </a:ln>
+        </p:spPr>
+        <p:style>
+          <a:lnRef idx="2">
+            <a:schemeClr val="accent1">
+              <a:shade val="50000"/>
+            </a:schemeClr>
+          </a:lnRef>
+          <a:fillRef idx="1">
+            <a:schemeClr val="accent1"/>
+          </a:fillRef>
+          <a:effectRef idx="0">
+            <a:schemeClr val="accent1"/>
+          </a:effectRef>
+          <a:fontRef idx="minor">
+            <a:schemeClr val="lt1"/>
+          </a:fontRef>
+        </p:style>
+        <p:txBody>
+          <a:bodyPr rtlCol="0" anchor="ctr"/>
+          <a:lstStyle/>
+          <a:p>
+            <a:pPr algn="ctr"/>
+            <a:endParaRPr lang="en-US"/>
+          </a:p>
+        </p:txBody>
+      </p:sp>
+      <p:sp>
+        <p:nvSpPr>
+          <p:cNvPr id="2" name="标题 1">
+            <a:extLst>
+              <a:ext uri="{FF2B5EF4-FFF2-40B4-BE49-F238E27FC236}">
+                <a16:creationId xmlns:a16="http://schemas.microsoft.com/office/drawing/2014/main" id="{45DECD4C-8063-7F7D-DB29-CA97D4C92700}"/>
+              </a:ext>
+            </a:extLst>
+          </p:cNvPr>
+          <p:cNvSpPr>
+            <a:spLocks noGrp="1"/>
+          </p:cNvSpPr>
+          <p:nvPr>
+            <p:ph type="title"/>
+          </p:nvPr>
+        </p:nvSpPr>
+        <p:spPr>
+          <a:xfrm>
+            <a:off x="411480" y="991443"/>
+            <a:ext cx="4443154" cy="1087819"/>
+          </a:xfrm>
+        </p:spPr>
+        <p:txBody>
+          <a:bodyPr anchor="b">
+            <a:normAutofit/>
+          </a:bodyPr>
+          <a:lstStyle/>
+          <a:p>
+            <a:r>
+              <a:rPr lang="en-US" altLang="zh-CN" sz="3400" b="1" dirty="0"/>
+              <a:t>Heatmap</a:t>
+            </a:r>
+            <a:endParaRPr lang="zh-CN" altLang="en-US" sz="3400" b="1" dirty="0"/>
+          </a:p>
+        </p:txBody>
+      </p:sp>
+      <p:sp>
+        <p:nvSpPr>
+          <p:cNvPr id="28" name="Rectangle 27">
+            <a:extLst>
+              <a:ext uri="{FF2B5EF4-FFF2-40B4-BE49-F238E27FC236}">
+                <a16:creationId xmlns:a16="http://schemas.microsoft.com/office/drawing/2014/main" id="{33AE4636-AEEC-45D6-84D4-7AC2DA48ECF8}"/>
+              </a:ext>
+              <a:ext uri="{C183D7F6-B498-43B3-948B-1728B52AA6E4}">
+                <adec:decorative xmlns:adec="http://schemas.microsoft.com/office/drawing/2017/decorative" val="1"/>
+              </a:ext>
+            </a:extLst>
+          </p:cNvPr>
+          <p:cNvSpPr>
+            <a:spLocks noGrp="1" noRot="1" noChangeAspect="1" noMove="1" noResize="1" noEditPoints="1" noAdjustHandles="1" noChangeArrowheads="1" noChangeShapeType="1" noTextEdit="1"/>
+          </p:cNvSpPr>
+          <p:nvPr>
+            <p:extLst>
+              <p:ext uri="{386F3935-93C4-4BCD-93E2-E3B085C9AB24}">
+                <p16:designElem xmlns:p16="http://schemas.microsoft.com/office/powerpoint/2015/main" val="1"/>
+              </p:ext>
+            </p:extLst>
+          </p:nvPr>
+        </p:nvSpPr>
+        <p:spPr>
+          <a:xfrm rot="5400000">
+            <a:off x="649223" y="387939"/>
+            <a:ext cx="73152" cy="548640"/>
+          </a:xfrm>
+          <a:prstGeom prst="rect">
+            <a:avLst/>
+          </a:prstGeom>
+          <a:solidFill>
+            <a:schemeClr val="accent2"/>
+          </a:solidFill>
+          <a:ln>
+            <a:noFill/>
+          </a:ln>
+        </p:spPr>
+        <p:style>
+          <a:lnRef idx="2">
+            <a:schemeClr val="accent1">
+              <a:shade val="50000"/>
+            </a:schemeClr>
+          </a:lnRef>
+          <a:fillRef idx="1">
+            <a:schemeClr val="accent1"/>
+          </a:fillRef>
+          <a:effectRef idx="0">
+            <a:schemeClr val="accent1"/>
+          </a:effectRef>
+          <a:fontRef idx="minor">
+            <a:schemeClr val="lt1"/>
+          </a:fontRef>
+        </p:style>
+        <p:txBody>
+          <a:bodyPr rtlCol="0" anchor="ctr"/>
+          <a:lstStyle/>
+          <a:p>
+            <a:pPr algn="ctr"/>
+            <a:endParaRPr lang="en-US">
+              <a:solidFill>
+                <a:prstClr val="white"/>
+              </a:solidFill>
+              <a:latin typeface="Calibri" panose="020F0502020204030204"/>
+            </a:endParaRPr>
+          </a:p>
+        </p:txBody>
+      </p:sp>
+      <p:sp>
+        <p:nvSpPr>
+          <p:cNvPr id="30" name="Rectangle 29">
+            <a:extLst>
+              <a:ext uri="{FF2B5EF4-FFF2-40B4-BE49-F238E27FC236}">
+                <a16:creationId xmlns:a16="http://schemas.microsoft.com/office/drawing/2014/main" id="{8D9CE0F4-2EB2-4F1F-8AAC-DB3571D9FE10}"/>
+              </a:ext>
+              <a:ext uri="{C183D7F6-B498-43B3-948B-1728B52AA6E4}">
+                <adec:decorative xmlns:adec="http://schemas.microsoft.com/office/drawing/2017/decorative" val="1"/>
+              </a:ext>
+            </a:extLst>
+          </p:cNvPr>
+          <p:cNvSpPr>
+            <a:spLocks noGrp="1" noRot="1" noChangeAspect="1" noMove="1" noResize="1" noEditPoints="1" noAdjustHandles="1" noChangeArrowheads="1" noChangeShapeType="1" noTextEdit="1"/>
+          </p:cNvSpPr>
+          <p:nvPr>
+            <p:extLst>
+              <p:ext uri="{386F3935-93C4-4BCD-93E2-E3B085C9AB24}">
+                <p16:designElem xmlns:p16="http://schemas.microsoft.com/office/powerpoint/2015/main" val="1"/>
+              </p:ext>
+            </p:extLst>
+          </p:nvPr>
+        </p:nvSpPr>
+        <p:spPr>
+          <a:xfrm>
+            <a:off x="411480" y="2285541"/>
+            <a:ext cx="4389120" cy="18288"/>
+          </a:xfrm>
+          <a:prstGeom prst="rect">
+            <a:avLst/>
+          </a:prstGeom>
+          <a:solidFill>
+            <a:srgbClr val="D5D5D5"/>
+          </a:solidFill>
+          <a:ln w="3175">
+            <a:noFill/>
+          </a:ln>
+          <a:effectLst/>
+        </p:spPr>
+        <p:style>
+          <a:lnRef idx="2">
+            <a:schemeClr val="accent1">
+              <a:shade val="50000"/>
+            </a:schemeClr>
+          </a:lnRef>
+          <a:fillRef idx="1">
+            <a:schemeClr val="accent1"/>
+          </a:fillRef>
+          <a:effectRef idx="0">
+            <a:schemeClr val="accent1"/>
+          </a:effectRef>
+          <a:fontRef idx="minor">
+            <a:schemeClr val="lt1"/>
+          </a:fontRef>
+        </p:style>
+        <p:txBody>
+          <a:bodyPr rtlCol="0" anchor="ctr"/>
+          <a:lstStyle/>
+          <a:p>
+            <a:pPr algn="ctr"/>
+            <a:endParaRPr lang="en-US">
+              <a:solidFill>
+                <a:prstClr val="white"/>
+              </a:solidFill>
+              <a:latin typeface="Calibri" panose="020F0502020204030204"/>
+            </a:endParaRPr>
+          </a:p>
+        </p:txBody>
+      </p:sp>
+      <p:sp>
+        <p:nvSpPr>
+          <p:cNvPr id="9" name="Content Placeholder 8">
+            <a:extLst>
+              <a:ext uri="{FF2B5EF4-FFF2-40B4-BE49-F238E27FC236}">
+                <a16:creationId xmlns:a16="http://schemas.microsoft.com/office/drawing/2014/main" id="{BC99AF29-964C-5F82-5668-9B87F5571FB9}"/>
+              </a:ext>
+            </a:extLst>
+          </p:cNvPr>
+          <p:cNvSpPr>
+            <a:spLocks noGrp="1"/>
+          </p:cNvSpPr>
+          <p:nvPr>
+            <p:ph idx="1"/>
+          </p:nvPr>
+        </p:nvSpPr>
+        <p:spPr>
+          <a:xfrm>
+            <a:off x="411480" y="2684095"/>
+            <a:ext cx="4443154" cy="3492868"/>
+          </a:xfrm>
+        </p:spPr>
+        <p:txBody>
+          <a:bodyPr>
+            <a:normAutofit fontScale="85000" lnSpcReduction="10000"/>
+          </a:bodyPr>
+          <a:lstStyle/>
+          <a:p>
+            <a:r>
+              <a:rPr lang="en-US" sz="1800" b="1" dirty="0"/>
+              <a:t>Higher temperatures tend to be associated with slightly lower crop yields across states. This is consistent with heat-stress effects on both crops, especially wheat.</a:t>
+            </a:r>
+          </a:p>
+          <a:p>
+            <a:r>
+              <a:rPr lang="en-US" altLang="zh-CN" sz="1800" b="1" dirty="0"/>
+              <a:t>Precipitation does not show a strong or consistent relationship with yields.</a:t>
+            </a:r>
+          </a:p>
+          <a:p>
+            <a:r>
+              <a:rPr lang="en-US" altLang="zh-CN" sz="1800" b="1" dirty="0"/>
+              <a:t>States with good conditions for one crop tend to have good conditions for the other.</a:t>
+            </a:r>
+          </a:p>
+          <a:p>
+            <a:r>
+              <a:rPr lang="en-US" altLang="zh-CN" sz="1800" b="1" dirty="0"/>
+              <a:t>Warmer years are slightly drier, but the relationship is weak and varies across states</a:t>
+            </a:r>
+          </a:p>
+          <a:p>
+            <a:r>
+              <a:rPr lang="en-US" altLang="zh-CN" sz="1800" b="1" dirty="0"/>
+              <a:t>Temperature is a more influential factor than precipitation for both crops, but neither variable alone is a strong predictor of yield — indicating complex interactions behind crop performance</a:t>
+            </a:r>
+            <a:endParaRPr lang="en-US" sz="1800" b="1" dirty="0"/>
+          </a:p>
+          <a:p>
+            <a:endParaRPr lang="en-US" sz="1800" b="1" dirty="0"/>
+          </a:p>
+        </p:txBody>
+      </p:sp>
+      <p:pic>
+        <p:nvPicPr>
+          <p:cNvPr id="5" name="内容占位符 4" descr="图表, 树状图&#10;&#10;AI 生成的内容可能不正确。">
+            <a:extLst>
+              <a:ext uri="{FF2B5EF4-FFF2-40B4-BE49-F238E27FC236}">
+                <a16:creationId xmlns:a16="http://schemas.microsoft.com/office/drawing/2014/main" id="{F59369AC-94C8-E8A1-3263-4FCF11ED56E3}"/>
+              </a:ext>
+            </a:extLst>
+          </p:cNvPr>
+          <p:cNvPicPr>
+            <a:picLocks noChangeAspect="1"/>
+          </p:cNvPicPr>
+          <p:nvPr/>
+        </p:nvPicPr>
+        <p:blipFill>
+          <a:blip r:embed="rId3">
+            <a:extLst>
+              <a:ext uri="{28A0092B-C50C-407E-A947-70E740481C1C}">
+                <a14:useLocalDpi xmlns:a14="http://schemas.microsoft.com/office/drawing/2010/main" val="0"/>
+              </a:ext>
+            </a:extLst>
+          </a:blip>
+          <a:stretch>
+            <a:fillRect/>
+          </a:stretch>
+        </p:blipFill>
+        <p:spPr>
+          <a:xfrm>
+            <a:off x="5021352" y="566839"/>
+            <a:ext cx="6903210" cy="5919502"/>
+          </a:xfrm>
+          <a:prstGeom prst="rect">
+            <a:avLst/>
+          </a:prstGeom>
+        </p:spPr>
+      </p:pic>
+    </p:spTree>
+    <p:extLst>
+      <p:ext uri="{BB962C8B-B14F-4D97-AF65-F5344CB8AC3E}">
+        <p14:creationId xmlns:p14="http://schemas.microsoft.com/office/powerpoint/2010/main" val="4237960083"/>
+      </p:ext>
+    </p:extLst>
+  </p:cSld>
+  <p:clrMapOvr>
+    <a:masterClrMapping/>
+  </p:clrMapOvr>
+</p:sld>
+</file>
+
+<file path=ppt/slides/slide11.xml><?xml version="1.0" encoding="utf-8"?>
+<p:sld xmlns:a="http://schemas.openxmlformats.org/drawingml/2006/main" xmlns:r="http://schemas.openxmlformats.org/officeDocument/2006/relationships" xmlns:p="http://schemas.openxmlformats.org/presentationml/2006/main">
+  <p:cSld>
+    <p:bg>
+      <p:bgPr>
+        <a:solidFill>
+          <a:schemeClr val="bg1"/>
+        </a:solidFill>
+        <a:effectLst/>
+      </p:bgPr>
+    </p:bg>
+    <p:spTree>
+      <p:nvGrpSpPr>
         <p:cNvPr id="1" name="">
           <a:extLst>
             <a:ext uri="{FF2B5EF4-FFF2-40B4-BE49-F238E27FC236}">
@@ -5168,7 +5623,7 @@
 </p:sld>
 </file>
 
-<file path=ppt/slides/slide11.xml><?xml version="1.0" encoding="utf-8"?>
+<file path=ppt/slides/slide12.xml><?xml version="1.0" encoding="utf-8"?>
 <p:sld xmlns:a="http://schemas.openxmlformats.org/drawingml/2006/main" xmlns:r="http://schemas.openxmlformats.org/officeDocument/2006/relationships" xmlns:p="http://schemas.openxmlformats.org/presentationml/2006/main">
   <p:cSld>
     <p:spTree>
@@ -5244,6 +5699,727 @@
 </file>
 
 <file path=ppt/slides/slide2.xml><?xml version="1.0" encoding="utf-8"?>
+<p:sld xmlns:a="http://schemas.openxmlformats.org/drawingml/2006/main" xmlns:r="http://schemas.openxmlformats.org/officeDocument/2006/relationships" xmlns:p="http://schemas.openxmlformats.org/presentationml/2006/main">
+  <p:cSld>
+    <p:bg>
+      <p:bgPr>
+        <a:solidFill>
+          <a:schemeClr val="bg1"/>
+        </a:solidFill>
+        <a:effectLst/>
+      </p:bgPr>
+    </p:bg>
+    <p:spTree>
+      <p:nvGrpSpPr>
+        <p:cNvPr id="1" name="">
+          <a:extLst>
+            <a:ext uri="{FF2B5EF4-FFF2-40B4-BE49-F238E27FC236}">
+              <a16:creationId xmlns:a16="http://schemas.microsoft.com/office/drawing/2014/main" id="{833B7594-36AA-ED27-7E56-2FA0469F833F}"/>
+            </a:ext>
+          </a:extLst>
+        </p:cNvPr>
+        <p:cNvGrpSpPr/>
+        <p:nvPr/>
+      </p:nvGrpSpPr>
+      <p:grpSpPr>
+        <a:xfrm>
+          <a:off x="0" y="0"/>
+          <a:ext cx="0" cy="0"/>
+          <a:chOff x="0" y="0"/>
+          <a:chExt cx="0" cy="0"/>
+        </a:xfrm>
+      </p:grpSpPr>
+      <p:sp useBgFill="1">
+        <p:nvSpPr>
+          <p:cNvPr id="86" name="Rectangle 85">
+            <a:extLst>
+              <a:ext uri="{FF2B5EF4-FFF2-40B4-BE49-F238E27FC236}">
+                <a16:creationId xmlns:a16="http://schemas.microsoft.com/office/drawing/2014/main" id="{2C61293E-6EBE-43EF-A52C-9BEBFD7679D4}"/>
+              </a:ext>
+              <a:ext uri="{C183D7F6-B498-43B3-948B-1728B52AA6E4}">
+                <adec:decorative xmlns:adec="http://schemas.microsoft.com/office/drawing/2017/decorative" val="1"/>
+              </a:ext>
+            </a:extLst>
+          </p:cNvPr>
+          <p:cNvSpPr>
+            <a:spLocks noGrp="1" noRot="1" noChangeAspect="1" noMove="1" noResize="1" noEditPoints="1" noAdjustHandles="1" noChangeArrowheads="1" noChangeShapeType="1" noTextEdit="1"/>
+          </p:cNvSpPr>
+          <p:nvPr>
+            <p:extLst>
+              <p:ext uri="{386F3935-93C4-4BCD-93E2-E3B085C9AB24}">
+                <p16:designElem xmlns:p16="http://schemas.microsoft.com/office/powerpoint/2015/main" val="1"/>
+              </p:ext>
+            </p:extLst>
+          </p:nvPr>
+        </p:nvSpPr>
+        <p:spPr>
+          <a:xfrm>
+            <a:off x="0" y="0"/>
+            <a:ext cx="12188952" cy="6858000"/>
+          </a:xfrm>
+          <a:prstGeom prst="rect">
+            <a:avLst/>
+          </a:prstGeom>
+          <a:ln>
+            <a:noFill/>
+          </a:ln>
+        </p:spPr>
+        <p:style>
+          <a:lnRef idx="2">
+            <a:schemeClr val="accent1">
+              <a:shade val="50000"/>
+            </a:schemeClr>
+          </a:lnRef>
+          <a:fillRef idx="1">
+            <a:schemeClr val="accent1"/>
+          </a:fillRef>
+          <a:effectRef idx="0">
+            <a:schemeClr val="accent1"/>
+          </a:effectRef>
+          <a:fontRef idx="minor">
+            <a:schemeClr val="lt1"/>
+          </a:fontRef>
+        </p:style>
+        <p:txBody>
+          <a:bodyPr rtlCol="0" anchor="ctr"/>
+          <a:lstStyle/>
+          <a:p>
+            <a:pPr algn="ctr"/>
+            <a:endParaRPr lang="en-US"/>
+          </a:p>
+        </p:txBody>
+      </p:sp>
+      <p:sp>
+        <p:nvSpPr>
+          <p:cNvPr id="2" name="标题 1">
+            <a:extLst>
+              <a:ext uri="{FF2B5EF4-FFF2-40B4-BE49-F238E27FC236}">
+                <a16:creationId xmlns:a16="http://schemas.microsoft.com/office/drawing/2014/main" id="{267453B9-643F-2A47-1CAE-8CA7E48D8C22}"/>
+              </a:ext>
+            </a:extLst>
+          </p:cNvPr>
+          <p:cNvSpPr>
+            <a:spLocks noGrp="1"/>
+          </p:cNvSpPr>
+          <p:nvPr>
+            <p:ph type="title"/>
+          </p:nvPr>
+        </p:nvSpPr>
+        <p:spPr>
+          <a:xfrm>
+            <a:off x="5297762" y="329184"/>
+            <a:ext cx="6251110" cy="1783080"/>
+          </a:xfrm>
+        </p:spPr>
+        <p:txBody>
+          <a:bodyPr anchor="b">
+            <a:normAutofit/>
+          </a:bodyPr>
+          <a:lstStyle/>
+          <a:p>
+            <a:r>
+              <a:rPr lang="en-US" altLang="zh-CN" sz="5400" b="1" dirty="0"/>
+              <a:t>Introduction</a:t>
+            </a:r>
+            <a:endParaRPr lang="zh-CN" altLang="en-US" sz="5400" b="1" dirty="0"/>
+          </a:p>
+        </p:txBody>
+      </p:sp>
+      <p:pic>
+        <p:nvPicPr>
+          <p:cNvPr id="75" name="Picture 74" descr="天空下的金色小麦">
+            <a:extLst>
+              <a:ext uri="{FF2B5EF4-FFF2-40B4-BE49-F238E27FC236}">
+                <a16:creationId xmlns:a16="http://schemas.microsoft.com/office/drawing/2014/main" id="{F7A28FB0-546A-9F78-AA02-E94A12B49F2C}"/>
+              </a:ext>
+            </a:extLst>
+          </p:cNvPr>
+          <p:cNvPicPr>
+            <a:picLocks noChangeAspect="1"/>
+          </p:cNvPicPr>
+          <p:nvPr/>
+        </p:nvPicPr>
+        <p:blipFill>
+          <a:blip r:embed="rId2"/>
+          <a:srcRect l="21695" r="32973" b="-1"/>
+          <a:stretch>
+            <a:fillRect/>
+          </a:stretch>
+        </p:blipFill>
+        <p:spPr>
+          <a:xfrm>
+            <a:off x="1" y="10"/>
+            <a:ext cx="4657344" cy="6857990"/>
+          </a:xfrm>
+          <a:custGeom>
+            <a:avLst/>
+            <a:gdLst/>
+            <a:ahLst/>
+            <a:cxnLst/>
+            <a:rect l="l" t="t" r="r" b="b"/>
+            <a:pathLst>
+              <a:path w="4657344" h="6858000">
+                <a:moveTo>
+                  <a:pt x="0" y="0"/>
+                </a:moveTo>
+                <a:lnTo>
+                  <a:pt x="3429755" y="0"/>
+                </a:lnTo>
+                <a:lnTo>
+                  <a:pt x="3526016" y="148742"/>
+                </a:lnTo>
+                <a:cubicBezTo>
+                  <a:pt x="3657740" y="365513"/>
+                  <a:pt x="3777402" y="589569"/>
+                  <a:pt x="3886489" y="819975"/>
+                </a:cubicBezTo>
+                <a:cubicBezTo>
+                  <a:pt x="3891856" y="833492"/>
+                  <a:pt x="3900663" y="845393"/>
+                  <a:pt x="3912049" y="854514"/>
+                </a:cubicBezTo>
+                <a:cubicBezTo>
+                  <a:pt x="3897352" y="819849"/>
+                  <a:pt x="3883037" y="784928"/>
+                  <a:pt x="3868083" y="750263"/>
+                </a:cubicBezTo>
+                <a:cubicBezTo>
+                  <a:pt x="3806989" y="608712"/>
+                  <a:pt x="3742478" y="469145"/>
+                  <a:pt x="3674155" y="331786"/>
+                </a:cubicBezTo>
+                <a:lnTo>
+                  <a:pt x="3496656" y="0"/>
+                </a:lnTo>
+                <a:lnTo>
+                  <a:pt x="3554371" y="0"/>
+                </a:lnTo>
+                <a:lnTo>
+                  <a:pt x="3661621" y="196614"/>
+                </a:lnTo>
+                <a:cubicBezTo>
+                  <a:pt x="3856899" y="573253"/>
+                  <a:pt x="4021071" y="966066"/>
+                  <a:pt x="4161279" y="1371196"/>
+                </a:cubicBezTo>
+                <a:cubicBezTo>
+                  <a:pt x="4379525" y="2007265"/>
+                  <a:pt x="4530141" y="2664286"/>
+                  <a:pt x="4610660" y="3331516"/>
+                </a:cubicBezTo>
+                <a:cubicBezTo>
+                  <a:pt x="4652837" y="3672965"/>
+                  <a:pt x="4671625" y="4013908"/>
+                  <a:pt x="4645040" y="4357388"/>
+                </a:cubicBezTo>
+                <a:cubicBezTo>
+                  <a:pt x="4613599" y="4758899"/>
+                  <a:pt x="4566181" y="5157998"/>
+                  <a:pt x="4485789" y="5552906"/>
+                </a:cubicBezTo>
+                <a:cubicBezTo>
+                  <a:pt x="4397121" y="5988893"/>
+                  <a:pt x="4276748" y="6414594"/>
+                  <a:pt x="4117769" y="6828295"/>
+                </a:cubicBezTo>
+                <a:lnTo>
+                  <a:pt x="4105288" y="6858000"/>
+                </a:lnTo>
+                <a:lnTo>
+                  <a:pt x="4052520" y="6858000"/>
+                </a:lnTo>
+                <a:lnTo>
+                  <a:pt x="4059369" y="6841549"/>
+                </a:lnTo>
+                <a:cubicBezTo>
+                  <a:pt x="4147276" y="6614016"/>
+                  <a:pt x="4224193" y="6380817"/>
+                  <a:pt x="4291518" y="6142729"/>
+                </a:cubicBezTo>
+                <a:cubicBezTo>
+                  <a:pt x="4350055" y="5935370"/>
+                  <a:pt x="4393256" y="5723695"/>
+                  <a:pt x="4443357" y="5513923"/>
+                </a:cubicBezTo>
+                <a:cubicBezTo>
+                  <a:pt x="4444541" y="5502788"/>
+                  <a:pt x="4445137" y="5491601"/>
+                  <a:pt x="4445146" y="5480401"/>
+                </a:cubicBezTo>
+                <a:cubicBezTo>
+                  <a:pt x="4408465" y="5607635"/>
+                  <a:pt x="4379196" y="5719759"/>
+                  <a:pt x="4344559" y="5830359"/>
+                </a:cubicBezTo>
+                <a:cubicBezTo>
+                  <a:pt x="4254261" y="6118381"/>
+                  <a:pt x="4150112" y="6398531"/>
+                  <a:pt x="4031702" y="6670527"/>
+                </a:cubicBezTo>
+                <a:lnTo>
+                  <a:pt x="3943824" y="6858000"/>
+                </a:lnTo>
+                <a:lnTo>
+                  <a:pt x="0" y="6858000"/>
+                </a:lnTo>
+                <a:close/>
+              </a:path>
+            </a:pathLst>
+          </a:custGeom>
+        </p:spPr>
+      </p:pic>
+      <p:sp>
+        <p:nvSpPr>
+          <p:cNvPr id="88" name="sketchy line">
+            <a:extLst>
+              <a:ext uri="{FF2B5EF4-FFF2-40B4-BE49-F238E27FC236}">
+                <a16:creationId xmlns:a16="http://schemas.microsoft.com/office/drawing/2014/main" id="{21540236-BFD5-4A9D-8840-4703E7F76825}"/>
+              </a:ext>
+              <a:ext uri="{C183D7F6-B498-43B3-948B-1728B52AA6E4}">
+                <adec:decorative xmlns:adec="http://schemas.microsoft.com/office/drawing/2017/decorative" val="1"/>
+              </a:ext>
+            </a:extLst>
+          </p:cNvPr>
+          <p:cNvSpPr>
+            <a:spLocks noGrp="1" noRot="1" noChangeAspect="1" noMove="1" noResize="1" noEditPoints="1" noAdjustHandles="1" noChangeArrowheads="1" noChangeShapeType="1" noTextEdit="1"/>
+          </p:cNvSpPr>
+          <p:nvPr>
+            <p:extLst>
+              <p:ext uri="{386F3935-93C4-4BCD-93E2-E3B085C9AB24}">
+                <p16:designElem xmlns:p16="http://schemas.microsoft.com/office/powerpoint/2015/main" val="1"/>
+              </p:ext>
+            </p:extLst>
+          </p:nvPr>
+        </p:nvSpPr>
+        <p:spPr>
+          <a:xfrm>
+            <a:off x="5297762" y="2374947"/>
+            <a:ext cx="4243589" cy="18288"/>
+          </a:xfrm>
+          <a:custGeom>
+            <a:avLst/>
+            <a:gdLst>
+              <a:gd name="connsiteX0" fmla="*/ 0 w 4243589"/>
+              <a:gd name="connsiteY0" fmla="*/ 0 h 18288"/>
+              <a:gd name="connsiteX1" fmla="*/ 478919 w 4243589"/>
+              <a:gd name="connsiteY1" fmla="*/ 0 h 18288"/>
+              <a:gd name="connsiteX2" fmla="*/ 957839 w 4243589"/>
+              <a:gd name="connsiteY2" fmla="*/ 0 h 18288"/>
+              <a:gd name="connsiteX3" fmla="*/ 1521630 w 4243589"/>
+              <a:gd name="connsiteY3" fmla="*/ 0 h 18288"/>
+              <a:gd name="connsiteX4" fmla="*/ 2212729 w 4243589"/>
+              <a:gd name="connsiteY4" fmla="*/ 0 h 18288"/>
+              <a:gd name="connsiteX5" fmla="*/ 2734084 w 4243589"/>
+              <a:gd name="connsiteY5" fmla="*/ 0 h 18288"/>
+              <a:gd name="connsiteX6" fmla="*/ 3255439 w 4243589"/>
+              <a:gd name="connsiteY6" fmla="*/ 0 h 18288"/>
+              <a:gd name="connsiteX7" fmla="*/ 4243589 w 4243589"/>
+              <a:gd name="connsiteY7" fmla="*/ 0 h 18288"/>
+              <a:gd name="connsiteX8" fmla="*/ 4243589 w 4243589"/>
+              <a:gd name="connsiteY8" fmla="*/ 18288 h 18288"/>
+              <a:gd name="connsiteX9" fmla="*/ 3594926 w 4243589"/>
+              <a:gd name="connsiteY9" fmla="*/ 18288 h 18288"/>
+              <a:gd name="connsiteX10" fmla="*/ 3073571 w 4243589"/>
+              <a:gd name="connsiteY10" fmla="*/ 18288 h 18288"/>
+              <a:gd name="connsiteX11" fmla="*/ 2552216 w 4243589"/>
+              <a:gd name="connsiteY11" fmla="*/ 18288 h 18288"/>
+              <a:gd name="connsiteX12" fmla="*/ 1903553 w 4243589"/>
+              <a:gd name="connsiteY12" fmla="*/ 18288 h 18288"/>
+              <a:gd name="connsiteX13" fmla="*/ 1212454 w 4243589"/>
+              <a:gd name="connsiteY13" fmla="*/ 18288 h 18288"/>
+              <a:gd name="connsiteX14" fmla="*/ 733535 w 4243589"/>
+              <a:gd name="connsiteY14" fmla="*/ 18288 h 18288"/>
+              <a:gd name="connsiteX15" fmla="*/ 0 w 4243589"/>
+              <a:gd name="connsiteY15" fmla="*/ 18288 h 18288"/>
+              <a:gd name="connsiteX16" fmla="*/ 0 w 4243589"/>
+              <a:gd name="connsiteY16" fmla="*/ 0 h 18288"/>
+            </a:gdLst>
+            <a:ahLst/>
+            <a:cxnLst>
+              <a:cxn ang="0">
+                <a:pos x="connsiteX0" y="connsiteY0"/>
+              </a:cxn>
+              <a:cxn ang="0">
+                <a:pos x="connsiteX1" y="connsiteY1"/>
+              </a:cxn>
+              <a:cxn ang="0">
+                <a:pos x="connsiteX2" y="connsiteY2"/>
+              </a:cxn>
+              <a:cxn ang="0">
+                <a:pos x="connsiteX3" y="connsiteY3"/>
+              </a:cxn>
+              <a:cxn ang="0">
+                <a:pos x="connsiteX4" y="connsiteY4"/>
+              </a:cxn>
+              <a:cxn ang="0">
+                <a:pos x="connsiteX5" y="connsiteY5"/>
+              </a:cxn>
+              <a:cxn ang="0">
+                <a:pos x="connsiteX6" y="connsiteY6"/>
+              </a:cxn>
+              <a:cxn ang="0">
+                <a:pos x="connsiteX7" y="connsiteY7"/>
+              </a:cxn>
+              <a:cxn ang="0">
+                <a:pos x="connsiteX8" y="connsiteY8"/>
+              </a:cxn>
+              <a:cxn ang="0">
+                <a:pos x="connsiteX9" y="connsiteY9"/>
+              </a:cxn>
+              <a:cxn ang="0">
+                <a:pos x="connsiteX10" y="connsiteY10"/>
+              </a:cxn>
+              <a:cxn ang="0">
+                <a:pos x="connsiteX11" y="connsiteY11"/>
+              </a:cxn>
+              <a:cxn ang="0">
+                <a:pos x="connsiteX12" y="connsiteY12"/>
+              </a:cxn>
+              <a:cxn ang="0">
+                <a:pos x="connsiteX13" y="connsiteY13"/>
+              </a:cxn>
+              <a:cxn ang="0">
+                <a:pos x="connsiteX14" y="connsiteY14"/>
+              </a:cxn>
+              <a:cxn ang="0">
+                <a:pos x="connsiteX15" y="connsiteY15"/>
+              </a:cxn>
+              <a:cxn ang="0">
+                <a:pos x="connsiteX16" y="connsiteY16"/>
+              </a:cxn>
+            </a:cxnLst>
+            <a:rect l="l" t="t" r="r" b="b"/>
+            <a:pathLst>
+              <a:path w="4243589" h="18288" fill="none" extrusionOk="0">
+                <a:moveTo>
+                  <a:pt x="0" y="0"/>
+                </a:moveTo>
+                <a:cubicBezTo>
+                  <a:pt x="213395" y="-21006"/>
+                  <a:pt x="307421" y="-18116"/>
+                  <a:pt x="478919" y="0"/>
+                </a:cubicBezTo>
+                <a:cubicBezTo>
+                  <a:pt x="650417" y="18116"/>
+                  <a:pt x="831092" y="-21237"/>
+                  <a:pt x="957839" y="0"/>
+                </a:cubicBezTo>
+                <a:cubicBezTo>
+                  <a:pt x="1084586" y="21237"/>
+                  <a:pt x="1301682" y="25124"/>
+                  <a:pt x="1521630" y="0"/>
+                </a:cubicBezTo>
+                <a:cubicBezTo>
+                  <a:pt x="1741578" y="-25124"/>
+                  <a:pt x="1970269" y="-29139"/>
+                  <a:pt x="2212729" y="0"/>
+                </a:cubicBezTo>
+                <a:cubicBezTo>
+                  <a:pt x="2455189" y="29139"/>
+                  <a:pt x="2558847" y="-4796"/>
+                  <a:pt x="2734084" y="0"/>
+                </a:cubicBezTo>
+                <a:cubicBezTo>
+                  <a:pt x="2909321" y="4796"/>
+                  <a:pt x="3097217" y="-13409"/>
+                  <a:pt x="3255439" y="0"/>
+                </a:cubicBezTo>
+                <a:cubicBezTo>
+                  <a:pt x="3413662" y="13409"/>
+                  <a:pt x="3979999" y="-10121"/>
+                  <a:pt x="4243589" y="0"/>
+                </a:cubicBezTo>
+                <a:cubicBezTo>
+                  <a:pt x="4244484" y="8974"/>
+                  <a:pt x="4243043" y="9359"/>
+                  <a:pt x="4243589" y="18288"/>
+                </a:cubicBezTo>
+                <a:cubicBezTo>
+                  <a:pt x="4058777" y="31246"/>
+                  <a:pt x="3910348" y="3158"/>
+                  <a:pt x="3594926" y="18288"/>
+                </a:cubicBezTo>
+                <a:cubicBezTo>
+                  <a:pt x="3279504" y="33418"/>
+                  <a:pt x="3319955" y="-3977"/>
+                  <a:pt x="3073571" y="18288"/>
+                </a:cubicBezTo>
+                <a:cubicBezTo>
+                  <a:pt x="2827187" y="40553"/>
+                  <a:pt x="2767387" y="1863"/>
+                  <a:pt x="2552216" y="18288"/>
+                </a:cubicBezTo>
+                <a:cubicBezTo>
+                  <a:pt x="2337046" y="34713"/>
+                  <a:pt x="2181871" y="19527"/>
+                  <a:pt x="1903553" y="18288"/>
+                </a:cubicBezTo>
+                <a:cubicBezTo>
+                  <a:pt x="1625235" y="17049"/>
+                  <a:pt x="1557672" y="24174"/>
+                  <a:pt x="1212454" y="18288"/>
+                </a:cubicBezTo>
+                <a:cubicBezTo>
+                  <a:pt x="867236" y="12402"/>
+                  <a:pt x="874382" y="15627"/>
+                  <a:pt x="733535" y="18288"/>
+                </a:cubicBezTo>
+                <a:cubicBezTo>
+                  <a:pt x="592688" y="20949"/>
+                  <a:pt x="183477" y="14753"/>
+                  <a:pt x="0" y="18288"/>
+                </a:cubicBezTo>
+                <a:cubicBezTo>
+                  <a:pt x="-229" y="14222"/>
+                  <a:pt x="509" y="5816"/>
+                  <a:pt x="0" y="0"/>
+                </a:cubicBezTo>
+                <a:close/>
+              </a:path>
+              <a:path w="4243589" h="18288" stroke="0" extrusionOk="0">
+                <a:moveTo>
+                  <a:pt x="0" y="0"/>
+                </a:moveTo>
+                <a:cubicBezTo>
+                  <a:pt x="143690" y="16630"/>
+                  <a:pt x="266667" y="14847"/>
+                  <a:pt x="521355" y="0"/>
+                </a:cubicBezTo>
+                <a:cubicBezTo>
+                  <a:pt x="776043" y="-14847"/>
+                  <a:pt x="814491" y="-17363"/>
+                  <a:pt x="1000275" y="0"/>
+                </a:cubicBezTo>
+                <a:cubicBezTo>
+                  <a:pt x="1186059" y="17363"/>
+                  <a:pt x="1352504" y="-23507"/>
+                  <a:pt x="1521630" y="0"/>
+                </a:cubicBezTo>
+                <a:cubicBezTo>
+                  <a:pt x="1690756" y="23507"/>
+                  <a:pt x="1889525" y="5871"/>
+                  <a:pt x="2127857" y="0"/>
+                </a:cubicBezTo>
+                <a:cubicBezTo>
+                  <a:pt x="2366189" y="-5871"/>
+                  <a:pt x="2620628" y="-27997"/>
+                  <a:pt x="2776520" y="0"/>
+                </a:cubicBezTo>
+                <a:cubicBezTo>
+                  <a:pt x="2932412" y="27997"/>
+                  <a:pt x="3131683" y="-25073"/>
+                  <a:pt x="3467618" y="0"/>
+                </a:cubicBezTo>
+                <a:cubicBezTo>
+                  <a:pt x="3803553" y="25073"/>
+                  <a:pt x="4017371" y="3071"/>
+                  <a:pt x="4243589" y="0"/>
+                </a:cubicBezTo>
+                <a:cubicBezTo>
+                  <a:pt x="4243134" y="6162"/>
+                  <a:pt x="4243492" y="11775"/>
+                  <a:pt x="4243589" y="18288"/>
+                </a:cubicBezTo>
+                <a:cubicBezTo>
+                  <a:pt x="4017834" y="-5779"/>
+                  <a:pt x="3834586" y="13376"/>
+                  <a:pt x="3594926" y="18288"/>
+                </a:cubicBezTo>
+                <a:cubicBezTo>
+                  <a:pt x="3355266" y="23200"/>
+                  <a:pt x="3204179" y="2869"/>
+                  <a:pt x="2903827" y="18288"/>
+                </a:cubicBezTo>
+                <a:cubicBezTo>
+                  <a:pt x="2603475" y="33707"/>
+                  <a:pt x="2526187" y="46187"/>
+                  <a:pt x="2212729" y="18288"/>
+                </a:cubicBezTo>
+                <a:cubicBezTo>
+                  <a:pt x="1899271" y="-9611"/>
+                  <a:pt x="1966289" y="29692"/>
+                  <a:pt x="1733809" y="18288"/>
+                </a:cubicBezTo>
+                <a:cubicBezTo>
+                  <a:pt x="1501329" y="6884"/>
+                  <a:pt x="1343612" y="12492"/>
+                  <a:pt x="1085146" y="18288"/>
+                </a:cubicBezTo>
+                <a:cubicBezTo>
+                  <a:pt x="826680" y="24084"/>
+                  <a:pt x="778184" y="35607"/>
+                  <a:pt x="521355" y="18288"/>
+                </a:cubicBezTo>
+                <a:cubicBezTo>
+                  <a:pt x="264526" y="969"/>
+                  <a:pt x="120277" y="4268"/>
+                  <a:pt x="0" y="18288"/>
+                </a:cubicBezTo>
+                <a:cubicBezTo>
+                  <a:pt x="766" y="10800"/>
+                  <a:pt x="-457" y="8180"/>
+                  <a:pt x="0" y="0"/>
+                </a:cubicBezTo>
+                <a:close/>
+              </a:path>
+            </a:pathLst>
+          </a:custGeom>
+          <a:solidFill>
+            <a:schemeClr val="accent2"/>
+          </a:solidFill>
+          <a:ln w="44450" cap="rnd">
+            <a:solidFill>
+              <a:schemeClr val="accent2"/>
+            </a:solidFill>
+            <a:round/>
+            <a:extLst>
+              <a:ext uri="{C807C97D-BFC1-408E-A445-0C87EB9F89A2}">
+                <ask:lineSketchStyleProps xmlns:ask="http://schemas.microsoft.com/office/drawing/2018/sketchyshapes" sd="2727557108">
+                  <a:prstGeom prst="rect">
+                    <a:avLst/>
+                  </a:prstGeom>
+                  <ask:type>
+                    <ask:lineSketchFreehand/>
+                  </ask:type>
+                </ask:lineSketchStyleProps>
+              </a:ext>
+            </a:extLst>
+          </a:ln>
+        </p:spPr>
+        <p:style>
+          <a:lnRef idx="2">
+            <a:schemeClr val="accent1">
+              <a:shade val="50000"/>
+            </a:schemeClr>
+          </a:lnRef>
+          <a:fillRef idx="1">
+            <a:schemeClr val="accent1"/>
+          </a:fillRef>
+          <a:effectRef idx="0">
+            <a:schemeClr val="accent1"/>
+          </a:effectRef>
+          <a:fontRef idx="minor">
+            <a:schemeClr val="lt1"/>
+          </a:fontRef>
+        </p:style>
+        <p:txBody>
+          <a:bodyPr rtlCol="0" anchor="ctr"/>
+          <a:lstStyle/>
+          <a:p>
+            <a:pPr algn="ctr"/>
+            <a:endParaRPr lang="en-US"/>
+          </a:p>
+        </p:txBody>
+      </p:sp>
+      <p:sp>
+        <p:nvSpPr>
+          <p:cNvPr id="73" name="Content Placeholder 8">
+            <a:extLst>
+              <a:ext uri="{FF2B5EF4-FFF2-40B4-BE49-F238E27FC236}">
+                <a16:creationId xmlns:a16="http://schemas.microsoft.com/office/drawing/2014/main" id="{CC64E247-12F4-CDB5-9709-B18680C18C1C}"/>
+              </a:ext>
+            </a:extLst>
+          </p:cNvPr>
+          <p:cNvSpPr>
+            <a:spLocks noGrp="1"/>
+          </p:cNvSpPr>
+          <p:nvPr>
+            <p:ph idx="1"/>
+          </p:nvPr>
+        </p:nvSpPr>
+        <p:spPr>
+          <a:xfrm>
+            <a:off x="5297762" y="2530549"/>
+            <a:ext cx="6251110" cy="3659939"/>
+          </a:xfrm>
+        </p:spPr>
+        <p:txBody>
+          <a:bodyPr>
+            <a:noAutofit/>
+          </a:bodyPr>
+          <a:lstStyle/>
+          <a:p>
+            <a:r>
+              <a:rPr lang="en-US" altLang="zh-CN" sz="1600" b="1" dirty="0"/>
+              <a:t>Project Goal</a:t>
+            </a:r>
+            <a:r>
+              <a:rPr lang="zh-CN" altLang="en-US" sz="1600" b="1" dirty="0"/>
+              <a:t>：</a:t>
+            </a:r>
+            <a:r>
+              <a:rPr lang="en-US" altLang="zh-CN" sz="1600" b="1" dirty="0"/>
+              <a:t>To examine how temperature and precipitation relate to corn and wheat yields across different U.S. states from 2015–2024</a:t>
+            </a:r>
+          </a:p>
+          <a:p>
+            <a:endParaRPr lang="en-US" altLang="zh-CN" sz="1600" b="1" dirty="0"/>
+          </a:p>
+          <a:p>
+            <a:r>
+              <a:rPr lang="en-US" altLang="zh-CN" sz="1600" b="1" dirty="0"/>
+              <a:t>Key Questions</a:t>
+            </a:r>
+            <a:r>
+              <a:rPr lang="zh-CN" altLang="en-US" sz="1600" b="1" dirty="0"/>
+              <a:t>：</a:t>
+            </a:r>
+            <a:endParaRPr lang="en-US" altLang="zh-CN" sz="1600" b="1" dirty="0"/>
+          </a:p>
+          <a:p>
+            <a:pPr lvl="1"/>
+            <a:r>
+              <a:rPr lang="en-US" altLang="zh-CN" sz="1600" b="1" dirty="0"/>
+              <a:t>Do corn and wheat respond differently to temperature and precipitation?</a:t>
+            </a:r>
+          </a:p>
+          <a:p>
+            <a:pPr lvl="1"/>
+            <a:r>
+              <a:rPr lang="en-US" altLang="zh-CN" sz="1600" b="1" dirty="0"/>
+              <a:t>Are climate–yield relationships consistent across states, or highly regional?</a:t>
+            </a:r>
+          </a:p>
+          <a:p>
+            <a:pPr lvl="1"/>
+            <a:r>
+              <a:rPr lang="en-US" altLang="zh-CN" sz="1600" b="1" dirty="0"/>
+              <a:t>Which climate variable appears more influential on crop yield?</a:t>
+            </a:r>
+          </a:p>
+          <a:p>
+            <a:endParaRPr lang="en-US" altLang="zh-CN" sz="1600" b="1" dirty="0"/>
+          </a:p>
+          <a:p>
+            <a:r>
+              <a:rPr lang="en-US" altLang="zh-CN" sz="1600" b="1" dirty="0"/>
+              <a:t>Approach</a:t>
+            </a:r>
+            <a:r>
+              <a:rPr lang="zh-CN" altLang="en-US" sz="1600" b="1" dirty="0"/>
+              <a:t>：</a:t>
+            </a:r>
+            <a:r>
+              <a:rPr lang="en-US" altLang="zh-CN" sz="1600" b="1" dirty="0"/>
+              <a:t>Integrating USDA crop yield data with NOAA climate records and apply correlation, regression, and trend analysis at the state level</a:t>
+            </a:r>
+          </a:p>
+        </p:txBody>
+      </p:sp>
+    </p:spTree>
+    <p:extLst>
+      <p:ext uri="{BB962C8B-B14F-4D97-AF65-F5344CB8AC3E}">
+        <p14:creationId xmlns:p14="http://schemas.microsoft.com/office/powerpoint/2010/main" val="2079476088"/>
+      </p:ext>
+    </p:extLst>
+  </p:cSld>
+  <p:clrMapOvr>
+    <a:masterClrMapping/>
+  </p:clrMapOvr>
+</p:sld>
+</file>
+
+<file path=ppt/slides/slide3.xml><?xml version="1.0" encoding="utf-8"?>
 <p:sld xmlns:a="http://schemas.openxmlformats.org/drawingml/2006/main" xmlns:r="http://schemas.openxmlformats.org/officeDocument/2006/relationships" xmlns:p="http://schemas.openxmlformats.org/presentationml/2006/main">
   <p:cSld>
     <p:spTree>
@@ -5822,7 +6998,7 @@
 </p:sld>
 </file>
 
-<file path=ppt/slides/slide3.xml><?xml version="1.0" encoding="utf-8"?>
+<file path=ppt/slides/slide4.xml><?xml version="1.0" encoding="utf-8"?>
 <p:sld xmlns:a="http://schemas.openxmlformats.org/drawingml/2006/main" xmlns:r="http://schemas.openxmlformats.org/officeDocument/2006/relationships" xmlns:p="http://schemas.openxmlformats.org/presentationml/2006/main">
   <p:cSld>
     <p:bg>
@@ -5922,7 +7098,7 @@
           <p:nvPr/>
         </p:nvPicPr>
         <p:blipFill>
-          <a:blip r:embed="rId2">
+          <a:blip r:embed="rId3">
             <a:extLst>
               <a:ext uri="{28A0092B-C50C-407E-A947-70E740481C1C}">
                 <a14:useLocalDpi xmlns:a14="http://schemas.microsoft.com/office/drawing/2010/main" val="0"/>
@@ -5936,7 +7112,7 @@
         </p:blipFill>
         <p:spPr>
           <a:xfrm>
-            <a:off x="-173620" y="1812979"/>
+            <a:off x="-88560" y="1728216"/>
             <a:ext cx="7974957" cy="4902097"/>
           </a:xfrm>
           <a:prstGeom prst="rect">
@@ -6327,7 +7503,7 @@
 </p:sld>
 </file>
 
-<file path=ppt/slides/slide4.xml><?xml version="1.0" encoding="utf-8"?>
+<file path=ppt/slides/slide5.xml><?xml version="1.0" encoding="utf-8"?>
 <p:sld xmlns:a="http://schemas.openxmlformats.org/drawingml/2006/main" xmlns:r="http://schemas.openxmlformats.org/officeDocument/2006/relationships" xmlns:p="http://schemas.openxmlformats.org/presentationml/2006/main">
   <p:cSld>
     <p:bg>
@@ -6839,7 +8015,7 @@
 </p:sld>
 </file>
 
-<file path=ppt/slides/slide5.xml><?xml version="1.0" encoding="utf-8"?>
+<file path=ppt/slides/slide6.xml><?xml version="1.0" encoding="utf-8"?>
 <p:sld xmlns:a="http://schemas.openxmlformats.org/drawingml/2006/main" xmlns:r="http://schemas.openxmlformats.org/officeDocument/2006/relationships" xmlns:p="http://schemas.openxmlformats.org/presentationml/2006/main">
   <p:cSld>
     <p:bg>
@@ -6930,48 +8106,6 @@
           </a:p>
         </p:txBody>
       </p:sp>
-      <p:sp>
-        <p:nvSpPr>
-          <p:cNvPr id="2" name="标题 1">
-            <a:extLst>
-              <a:ext uri="{FF2B5EF4-FFF2-40B4-BE49-F238E27FC236}">
-                <a16:creationId xmlns:a16="http://schemas.microsoft.com/office/drawing/2014/main" id="{25E15CCD-1C8D-C225-D0E6-09876BD6B982}"/>
-              </a:ext>
-            </a:extLst>
-          </p:cNvPr>
-          <p:cNvSpPr>
-            <a:spLocks noGrp="1"/>
-          </p:cNvSpPr>
-          <p:nvPr>
-            <p:ph type="title"/>
-          </p:nvPr>
-        </p:nvSpPr>
-        <p:spPr>
-          <a:xfrm>
-            <a:off x="146107" y="-471329"/>
-            <a:ext cx="3357159" cy="2785947"/>
-          </a:xfrm>
-        </p:spPr>
-        <p:txBody>
-          <a:bodyPr vert="horz" lIns="91440" tIns="45720" rIns="91440" bIns="45720" rtlCol="0" anchor="b">
-            <a:normAutofit/>
-          </a:bodyPr>
-          <a:lstStyle/>
-          <a:p>
-            <a:r>
-              <a:rPr lang="en-US" altLang="zh-CN" sz="3600" b="1" kern="1200" dirty="0">
-                <a:solidFill>
-                  <a:schemeClr val="tx1"/>
-                </a:solidFill>
-                <a:latin typeface="+mj-lt"/>
-                <a:ea typeface="+mj-ea"/>
-                <a:cs typeface="+mj-cs"/>
-              </a:rPr>
-              <a:t>Effect of Temperature on Corn Yields (per state)</a:t>
-            </a:r>
-          </a:p>
-        </p:txBody>
-      </p:sp>
       <p:pic>
         <p:nvPicPr>
           <p:cNvPr id="21" name="图片 20" descr="图表, 散点图&#10;&#10;AI 生成的内容可能不正确。">
@@ -7001,8 +8135,8 @@
         </p:blipFill>
         <p:spPr>
           <a:xfrm>
-            <a:off x="-121889" y="3273012"/>
-            <a:ext cx="4033265" cy="3025573"/>
+            <a:off x="0" y="3767891"/>
+            <a:ext cx="3703413" cy="2778133"/>
           </a:xfrm>
           <a:prstGeom prst="rect">
             <a:avLst/>
@@ -7038,8 +8172,8 @@
         </p:blipFill>
         <p:spPr>
           <a:xfrm>
-            <a:off x="7570565" y="10"/>
-            <a:ext cx="4614002" cy="3337539"/>
+            <a:off x="3703413" y="842243"/>
+            <a:ext cx="3811271" cy="2756884"/>
           </a:xfrm>
           <a:prstGeom prst="rect">
             <a:avLst/>
@@ -7075,8 +8209,8 @@
         </p:blipFill>
         <p:spPr>
           <a:xfrm>
-            <a:off x="3911376" y="3520452"/>
-            <a:ext cx="3727405" cy="3025572"/>
+            <a:off x="4029741" y="3789140"/>
+            <a:ext cx="3396390" cy="2756884"/>
           </a:xfrm>
           <a:prstGeom prst="rect">
             <a:avLst/>
@@ -7112,8 +8246,8 @@
         </p:blipFill>
         <p:spPr>
           <a:xfrm>
-            <a:off x="7577998" y="3509255"/>
-            <a:ext cx="4614002" cy="3348735"/>
+            <a:off x="7752459" y="3789140"/>
+            <a:ext cx="3798529" cy="2756884"/>
           </a:xfrm>
           <a:prstGeom prst="rect">
             <a:avLst/>
@@ -7149,14 +8283,93 @@
         </p:blipFill>
         <p:spPr>
           <a:xfrm>
-            <a:off x="3661191" y="125981"/>
-            <a:ext cx="3916807" cy="3179299"/>
+            <a:off x="341883" y="842243"/>
+            <a:ext cx="3548257" cy="2880144"/>
           </a:xfrm>
           <a:prstGeom prst="rect">
             <a:avLst/>
           </a:prstGeom>
         </p:spPr>
       </p:pic>
+      <p:sp>
+        <p:nvSpPr>
+          <p:cNvPr id="2" name="标题 1">
+            <a:extLst>
+              <a:ext uri="{FF2B5EF4-FFF2-40B4-BE49-F238E27FC236}">
+                <a16:creationId xmlns:a16="http://schemas.microsoft.com/office/drawing/2014/main" id="{25E15CCD-1C8D-C225-D0E6-09876BD6B982}"/>
+              </a:ext>
+            </a:extLst>
+          </p:cNvPr>
+          <p:cNvSpPr>
+            <a:spLocks noGrp="1"/>
+          </p:cNvSpPr>
+          <p:nvPr>
+            <p:ph type="title"/>
+          </p:nvPr>
+        </p:nvSpPr>
+        <p:spPr>
+          <a:xfrm>
+            <a:off x="-2" y="58427"/>
+            <a:ext cx="12192001" cy="528348"/>
+          </a:xfrm>
+        </p:spPr>
+        <p:txBody>
+          <a:bodyPr vert="horz" lIns="91440" tIns="45720" rIns="91440" bIns="45720" rtlCol="0" anchor="b">
+            <a:normAutofit/>
+          </a:bodyPr>
+          <a:lstStyle/>
+          <a:p>
+            <a:pPr algn="ctr"/>
+            <a:r>
+              <a:rPr lang="en-US" altLang="zh-CN" sz="2800" b="1" kern="1200" dirty="0">
+                <a:solidFill>
+                  <a:schemeClr val="tx1"/>
+                </a:solidFill>
+                <a:latin typeface="+mj-lt"/>
+                <a:ea typeface="+mj-ea"/>
+                <a:cs typeface="+mj-cs"/>
+              </a:rPr>
+              <a:t>Effect of Temperature on Corn Yields (per state)</a:t>
+            </a:r>
+          </a:p>
+        </p:txBody>
+      </p:sp>
+      <p:sp>
+        <p:nvSpPr>
+          <p:cNvPr id="3" name="文本框 2">
+            <a:extLst>
+              <a:ext uri="{FF2B5EF4-FFF2-40B4-BE49-F238E27FC236}">
+                <a16:creationId xmlns:a16="http://schemas.microsoft.com/office/drawing/2014/main" id="{BF8E6FFA-F2CD-F47D-70D0-849914FE4AFC}"/>
+              </a:ext>
+            </a:extLst>
+          </p:cNvPr>
+          <p:cNvSpPr txBox="1"/>
+          <p:nvPr/>
+        </p:nvSpPr>
+        <p:spPr>
+          <a:xfrm>
+            <a:off x="7752459" y="1201110"/>
+            <a:ext cx="4186537" cy="738664"/>
+          </a:xfrm>
+          <a:prstGeom prst="rect">
+            <a:avLst/>
+          </a:prstGeom>
+          <a:noFill/>
+        </p:spPr>
+        <p:txBody>
+          <a:bodyPr wrap="square" rtlCol="0">
+            <a:spAutoFit/>
+          </a:bodyPr>
+          <a:lstStyle/>
+          <a:p>
+            <a:r>
+              <a:rPr lang="en-US" altLang="zh-CN" sz="1400" b="1" dirty="0"/>
+              <a:t>Each point represents a state-level annual observation, pairing average temperature with corn yield for that year</a:t>
+            </a:r>
+            <a:endParaRPr lang="zh-CN" altLang="en-US" sz="1400" b="1" dirty="0"/>
+          </a:p>
+        </p:txBody>
+      </p:sp>
     </p:spTree>
     <p:extLst>
       <p:ext uri="{BB962C8B-B14F-4D97-AF65-F5344CB8AC3E}">
@@ -7170,7 +8383,7 @@
 </p:sld>
 </file>
 
-<file path=ppt/slides/slide6.xml><?xml version="1.0" encoding="utf-8"?>
+<file path=ppt/slides/slide7.xml><?xml version="1.0" encoding="utf-8"?>
 <p:sld xmlns:a="http://schemas.openxmlformats.org/drawingml/2006/main" xmlns:r="http://schemas.openxmlformats.org/officeDocument/2006/relationships" xmlns:p="http://schemas.openxmlformats.org/presentationml/2006/main">
   <p:cSld>
     <p:bg>
@@ -7289,8 +8502,8 @@
         </p:blipFill>
         <p:spPr>
           <a:xfrm>
-            <a:off x="4027455" y="29340"/>
-            <a:ext cx="4069655" cy="3052240"/>
+            <a:off x="112942" y="880656"/>
+            <a:ext cx="3709841" cy="2782380"/>
           </a:xfrm>
           <a:prstGeom prst="rect">
             <a:avLst/>
@@ -7325,8 +8538,8 @@
         </p:blipFill>
         <p:spPr>
           <a:xfrm>
-            <a:off x="8290543" y="3429000"/>
-            <a:ext cx="3903628" cy="2927720"/>
+            <a:off x="8032590" y="3785516"/>
+            <a:ext cx="3736697" cy="2802522"/>
           </a:xfrm>
           <a:prstGeom prst="rect">
             <a:avLst/>
@@ -7361,8 +8574,8 @@
         </p:blipFill>
         <p:spPr>
           <a:xfrm>
-            <a:off x="-5221" y="3107868"/>
-            <a:ext cx="4331806" cy="3248852"/>
+            <a:off x="139799" y="3754576"/>
+            <a:ext cx="3736697" cy="2802521"/>
           </a:xfrm>
           <a:prstGeom prst="rect">
             <a:avLst/>
@@ -7397,8 +8610,8 @@
         </p:blipFill>
         <p:spPr>
           <a:xfrm>
-            <a:off x="7988307" y="0"/>
-            <a:ext cx="4203693" cy="3152768"/>
+            <a:off x="3822783" y="888228"/>
+            <a:ext cx="3929675" cy="2947255"/>
           </a:xfrm>
           <a:prstGeom prst="rect">
             <a:avLst/>
@@ -7423,8 +8636,8 @@
         </p:nvSpPr>
         <p:spPr>
           <a:xfrm>
-            <a:off x="289560" y="-633428"/>
-            <a:ext cx="3936557" cy="3344266"/>
+            <a:off x="0" y="0"/>
+            <a:ext cx="12188951" cy="501280"/>
           </a:xfrm>
         </p:spPr>
         <p:txBody>
@@ -7433,8 +8646,9 @@
           </a:bodyPr>
           <a:lstStyle/>
           <a:p>
-            <a:r>
-              <a:rPr lang="en-US" altLang="zh-CN" sz="3600" b="1" kern="1200" dirty="0">
+            <a:pPr algn="ctr"/>
+            <a:r>
+              <a:rPr lang="en-US" altLang="zh-CN" sz="2800" b="1" kern="1200" dirty="0">
                 <a:solidFill>
                   <a:schemeClr val="tx1"/>
                 </a:solidFill>
@@ -7475,14 +8689,50 @@
         </p:blipFill>
         <p:spPr>
           <a:xfrm>
-            <a:off x="4129535" y="3152768"/>
-            <a:ext cx="4271938" cy="3203952"/>
+            <a:off x="4016295" y="3779537"/>
+            <a:ext cx="3736697" cy="2802521"/>
           </a:xfrm>
           <a:prstGeom prst="rect">
             <a:avLst/>
           </a:prstGeom>
         </p:spPr>
       </p:pic>
+      <p:sp>
+        <p:nvSpPr>
+          <p:cNvPr id="3" name="文本框 2">
+            <a:extLst>
+              <a:ext uri="{FF2B5EF4-FFF2-40B4-BE49-F238E27FC236}">
+                <a16:creationId xmlns:a16="http://schemas.microsoft.com/office/drawing/2014/main" id="{96BA27FB-D71C-98F4-5D3F-4045DC0D6B30}"/>
+              </a:ext>
+            </a:extLst>
+          </p:cNvPr>
+          <p:cNvSpPr txBox="1"/>
+          <p:nvPr/>
+        </p:nvSpPr>
+        <p:spPr>
+          <a:xfrm>
+            <a:off x="7752459" y="1201110"/>
+            <a:ext cx="4186537" cy="738664"/>
+          </a:xfrm>
+          <a:prstGeom prst="rect">
+            <a:avLst/>
+          </a:prstGeom>
+          <a:noFill/>
+        </p:spPr>
+        <p:txBody>
+          <a:bodyPr wrap="square" rtlCol="0">
+            <a:spAutoFit/>
+          </a:bodyPr>
+          <a:lstStyle/>
+          <a:p>
+            <a:r>
+              <a:rPr lang="en-US" altLang="zh-CN" sz="1400" b="1" dirty="0"/>
+              <a:t>Each point represents a state-level annual observation, pairing average temperature with wheat yield for that year</a:t>
+            </a:r>
+            <a:endParaRPr lang="zh-CN" altLang="en-US" sz="1400" b="1" dirty="0"/>
+          </a:p>
+        </p:txBody>
+      </p:sp>
     </p:spTree>
     <p:extLst>
       <p:ext uri="{BB962C8B-B14F-4D97-AF65-F5344CB8AC3E}">
@@ -7496,7 +8746,7 @@
 </p:sld>
 </file>
 
-<file path=ppt/slides/slide7.xml><?xml version="1.0" encoding="utf-8"?>
+<file path=ppt/slides/slide8.xml><?xml version="1.0" encoding="utf-8"?>
 <p:sld xmlns:a="http://schemas.openxmlformats.org/drawingml/2006/main" xmlns:r="http://schemas.openxmlformats.org/officeDocument/2006/relationships" xmlns:p="http://schemas.openxmlformats.org/presentationml/2006/main">
   <p:cSld>
     <p:bg>
@@ -7605,8 +8855,8 @@
         </p:nvSpPr>
         <p:spPr>
           <a:xfrm>
-            <a:off x="34399" y="-336311"/>
-            <a:ext cx="3357159" cy="2785947"/>
+            <a:off x="19391" y="0"/>
+            <a:ext cx="12150168" cy="525143"/>
           </a:xfrm>
         </p:spPr>
         <p:txBody>
@@ -7615,8 +8865,9 @@
           </a:bodyPr>
           <a:lstStyle/>
           <a:p>
-            <a:r>
-              <a:rPr lang="en-US" altLang="zh-CN" sz="3600" b="1" kern="1200" dirty="0">
+            <a:pPr algn="ctr"/>
+            <a:r>
+              <a:rPr lang="en-US" altLang="zh-CN" sz="2800" b="1" kern="1200" dirty="0">
                 <a:solidFill>
                   <a:schemeClr val="tx1"/>
                 </a:solidFill>
@@ -7658,8 +8909,8 @@
         </p:blipFill>
         <p:spPr>
           <a:xfrm>
-            <a:off x="34399" y="3260903"/>
-            <a:ext cx="3946949" cy="3093324"/>
+            <a:off x="38783" y="3629106"/>
+            <a:ext cx="3671980" cy="2877824"/>
           </a:xfrm>
           <a:prstGeom prst="rect">
             <a:avLst/>
@@ -7695,8 +8946,8 @@
         </p:blipFill>
         <p:spPr>
           <a:xfrm>
-            <a:off x="7570565" y="10"/>
-            <a:ext cx="4614002" cy="3337539"/>
+            <a:off x="3646401" y="825639"/>
+            <a:ext cx="3978467" cy="2877824"/>
           </a:xfrm>
           <a:prstGeom prst="rect">
             <a:avLst/>
@@ -7732,8 +8983,8 @@
         </p:blipFill>
         <p:spPr>
           <a:xfrm>
-            <a:off x="3231484" y="0"/>
-            <a:ext cx="4614002" cy="3348735"/>
+            <a:off x="38783" y="924995"/>
+            <a:ext cx="3691372" cy="2679111"/>
           </a:xfrm>
           <a:prstGeom prst="rect">
             <a:avLst/>
@@ -7768,8 +9019,8 @@
         </p:blipFill>
         <p:spPr>
           <a:xfrm>
-            <a:off x="3816219" y="3284038"/>
-            <a:ext cx="4062740" cy="3047055"/>
+            <a:off x="3710763" y="3629106"/>
+            <a:ext cx="3914105" cy="2935579"/>
           </a:xfrm>
           <a:prstGeom prst="rect">
             <a:avLst/>
@@ -7804,14 +9055,50 @@
         </p:blipFill>
         <p:spPr>
           <a:xfrm>
-            <a:off x="7746869" y="3194298"/>
-            <a:ext cx="4444274" cy="3333206"/>
+            <a:off x="7758682" y="3629107"/>
+            <a:ext cx="3914105" cy="2935579"/>
           </a:xfrm>
           <a:prstGeom prst="rect">
             <a:avLst/>
           </a:prstGeom>
         </p:spPr>
       </p:pic>
+      <p:sp>
+        <p:nvSpPr>
+          <p:cNvPr id="3" name="文本框 2">
+            <a:extLst>
+              <a:ext uri="{FF2B5EF4-FFF2-40B4-BE49-F238E27FC236}">
+                <a16:creationId xmlns:a16="http://schemas.microsoft.com/office/drawing/2014/main" id="{DF605B47-1622-2C27-93F0-67BCC86023F3}"/>
+              </a:ext>
+            </a:extLst>
+          </p:cNvPr>
+          <p:cNvSpPr txBox="1"/>
+          <p:nvPr/>
+        </p:nvSpPr>
+        <p:spPr>
+          <a:xfrm>
+            <a:off x="7624868" y="1405477"/>
+            <a:ext cx="4186537" cy="738664"/>
+          </a:xfrm>
+          <a:prstGeom prst="rect">
+            <a:avLst/>
+          </a:prstGeom>
+          <a:noFill/>
+        </p:spPr>
+        <p:txBody>
+          <a:bodyPr wrap="square" rtlCol="0">
+            <a:spAutoFit/>
+          </a:bodyPr>
+          <a:lstStyle/>
+          <a:p>
+            <a:r>
+              <a:rPr lang="en-US" altLang="zh-CN" sz="1400" b="1" dirty="0"/>
+              <a:t>Each point represents a state-level annual observation, pairing average precipitation with corn yield for that year</a:t>
+            </a:r>
+            <a:endParaRPr lang="zh-CN" altLang="en-US" sz="1400" b="1" dirty="0"/>
+          </a:p>
+        </p:txBody>
+      </p:sp>
     </p:spTree>
     <p:extLst>
       <p:ext uri="{BB962C8B-B14F-4D97-AF65-F5344CB8AC3E}">
@@ -7825,7 +9112,7 @@
 </p:sld>
 </file>
 
-<file path=ppt/slides/slide8.xml><?xml version="1.0" encoding="utf-8"?>
+<file path=ppt/slides/slide9.xml><?xml version="1.0" encoding="utf-8"?>
 <p:sld xmlns:a="http://schemas.openxmlformats.org/drawingml/2006/main" xmlns:r="http://schemas.openxmlformats.org/officeDocument/2006/relationships" xmlns:p="http://schemas.openxmlformats.org/presentationml/2006/main">
   <p:cSld>
     <p:spTree>
@@ -7866,18 +9153,19 @@
         </p:nvSpPr>
         <p:spPr>
           <a:xfrm>
-            <a:off x="144862" y="-385473"/>
-            <a:ext cx="3357159" cy="2785947"/>
+            <a:off x="0" y="-11176"/>
+            <a:ext cx="12192000" cy="627864"/>
           </a:xfrm>
         </p:spPr>
         <p:txBody>
           <a:bodyPr vert="horz" lIns="91440" tIns="45720" rIns="91440" bIns="45720" rtlCol="0" anchor="b">
-            <a:normAutofit fontScale="90000"/>
+            <a:normAutofit/>
           </a:bodyPr>
           <a:lstStyle/>
           <a:p>
-            <a:r>
-              <a:rPr lang="en-US" altLang="zh-CN" sz="4000" b="1" kern="1200" dirty="0">
+            <a:pPr algn="ctr"/>
+            <a:r>
+              <a:rPr lang="en-US" altLang="zh-CN" sz="2800" b="1" kern="1200" dirty="0">
                 <a:solidFill>
                   <a:schemeClr val="tx1"/>
                 </a:solidFill>
@@ -7917,8 +9205,8 @@
         </p:blipFill>
         <p:spPr>
           <a:xfrm>
-            <a:off x="34399" y="3260903"/>
-            <a:ext cx="3946949" cy="3093324"/>
+            <a:off x="112427" y="3743579"/>
+            <a:ext cx="3611122" cy="2830128"/>
           </a:xfrm>
           <a:prstGeom prst="rect">
             <a:avLst/>
@@ -7952,8 +9240,8 @@
         </p:blipFill>
         <p:spPr>
           <a:xfrm>
-            <a:off x="7570565" y="10"/>
-            <a:ext cx="4614002" cy="3337539"/>
+            <a:off x="3835046" y="861913"/>
+            <a:ext cx="3757312" cy="2717852"/>
           </a:xfrm>
           <a:prstGeom prst="rect">
             <a:avLst/>
@@ -7987,8 +9275,8 @@
         </p:blipFill>
         <p:spPr>
           <a:xfrm>
-            <a:off x="3231484" y="0"/>
-            <a:ext cx="4614002" cy="3348735"/>
+            <a:off x="-33762" y="816894"/>
+            <a:ext cx="3868808" cy="2807890"/>
           </a:xfrm>
           <a:prstGeom prst="rect">
             <a:avLst/>
@@ -8022,8 +9310,8 @@
         </p:blipFill>
         <p:spPr>
           <a:xfrm>
-            <a:off x="3816219" y="3284038"/>
-            <a:ext cx="4062740" cy="3047055"/>
+            <a:off x="3798229" y="3755723"/>
+            <a:ext cx="3757312" cy="2817984"/>
           </a:xfrm>
           <a:prstGeom prst="rect">
             <a:avLst/>
@@ -8057,388 +9345,54 @@
         </p:blipFill>
         <p:spPr>
           <a:xfrm>
-            <a:off x="7746869" y="3194298"/>
-            <a:ext cx="4444274" cy="3333205"/>
+            <a:off x="7704902" y="3755723"/>
+            <a:ext cx="3844794" cy="2883595"/>
           </a:xfrm>
           <a:prstGeom prst="rect">
             <a:avLst/>
           </a:prstGeom>
         </p:spPr>
       </p:pic>
+      <p:sp>
+        <p:nvSpPr>
+          <p:cNvPr id="3" name="文本框 2">
+            <a:extLst>
+              <a:ext uri="{FF2B5EF4-FFF2-40B4-BE49-F238E27FC236}">
+                <a16:creationId xmlns:a16="http://schemas.microsoft.com/office/drawing/2014/main" id="{2B4B22D2-0CAC-59CA-2860-976DBD11A7C3}"/>
+              </a:ext>
+            </a:extLst>
+          </p:cNvPr>
+          <p:cNvSpPr txBox="1"/>
+          <p:nvPr/>
+        </p:nvSpPr>
+        <p:spPr>
+          <a:xfrm>
+            <a:off x="7624868" y="1405477"/>
+            <a:ext cx="4186537" cy="738664"/>
+          </a:xfrm>
+          <a:prstGeom prst="rect">
+            <a:avLst/>
+          </a:prstGeom>
+          <a:noFill/>
+        </p:spPr>
+        <p:txBody>
+          <a:bodyPr wrap="square" rtlCol="0">
+            <a:spAutoFit/>
+          </a:bodyPr>
+          <a:lstStyle/>
+          <a:p>
+            <a:r>
+              <a:rPr lang="en-US" altLang="zh-CN" sz="1400" b="1" dirty="0"/>
+              <a:t>Each point represents a state-level annual observation, pairing average precipitation with wheat yield for that year</a:t>
+            </a:r>
+            <a:endParaRPr lang="zh-CN" altLang="en-US" sz="1400" b="1" dirty="0"/>
+          </a:p>
+        </p:txBody>
+      </p:sp>
     </p:spTree>
     <p:extLst>
       <p:ext uri="{BB962C8B-B14F-4D97-AF65-F5344CB8AC3E}">
         <p14:creationId xmlns:p14="http://schemas.microsoft.com/office/powerpoint/2010/main" val="4115481588"/>
-      </p:ext>
-    </p:extLst>
-  </p:cSld>
-  <p:clrMapOvr>
-    <a:masterClrMapping/>
-  </p:clrMapOvr>
-</p:sld>
-</file>
-
-<file path=ppt/slides/slide9.xml><?xml version="1.0" encoding="utf-8"?>
-<p:sld xmlns:a="http://schemas.openxmlformats.org/drawingml/2006/main" xmlns:r="http://schemas.openxmlformats.org/officeDocument/2006/relationships" xmlns:p="http://schemas.openxmlformats.org/presentationml/2006/main">
-  <p:cSld>
-    <p:bg>
-      <p:bgPr>
-        <a:solidFill>
-          <a:schemeClr val="bg1"/>
-        </a:solidFill>
-        <a:effectLst/>
-      </p:bgPr>
-    </p:bg>
-    <p:spTree>
-      <p:nvGrpSpPr>
-        <p:cNvPr id="1" name=""/>
-        <p:cNvGrpSpPr/>
-        <p:nvPr/>
-      </p:nvGrpSpPr>
-      <p:grpSpPr>
-        <a:xfrm>
-          <a:off x="0" y="0"/>
-          <a:ext cx="0" cy="0"/>
-          <a:chOff x="0" y="0"/>
-          <a:chExt cx="0" cy="0"/>
-        </a:xfrm>
-      </p:grpSpPr>
-      <p:sp useBgFill="1">
-        <p:nvSpPr>
-          <p:cNvPr id="26" name="Rectangle 25">
-            <a:extLst>
-              <a:ext uri="{FF2B5EF4-FFF2-40B4-BE49-F238E27FC236}">
-                <a16:creationId xmlns:a16="http://schemas.microsoft.com/office/drawing/2014/main" id="{0B9EE3F3-89B7-43C3-8651-C4C96830993D}"/>
-              </a:ext>
-              <a:ext uri="{C183D7F6-B498-43B3-948B-1728B52AA6E4}">
-                <adec:decorative xmlns:adec="http://schemas.microsoft.com/office/drawing/2017/decorative" val="1"/>
-              </a:ext>
-            </a:extLst>
-          </p:cNvPr>
-          <p:cNvSpPr>
-            <a:spLocks noGrp="1" noRot="1" noChangeAspect="1" noMove="1" noResize="1" noEditPoints="1" noAdjustHandles="1" noChangeArrowheads="1" noChangeShapeType="1" noTextEdit="1"/>
-          </p:cNvSpPr>
-          <p:nvPr>
-            <p:extLst>
-              <p:ext uri="{386F3935-93C4-4BCD-93E2-E3B085C9AB24}">
-                <p16:designElem xmlns:p16="http://schemas.microsoft.com/office/powerpoint/2015/main" val="1"/>
-              </p:ext>
-            </p:extLst>
-          </p:nvPr>
-        </p:nvSpPr>
-        <p:spPr>
-          <a:xfrm>
-            <a:off x="0" y="0"/>
-            <a:ext cx="12192000" cy="6858000"/>
-          </a:xfrm>
-          <a:prstGeom prst="rect">
-            <a:avLst/>
-          </a:prstGeom>
-          <a:ln>
-            <a:noFill/>
-          </a:ln>
-        </p:spPr>
-        <p:style>
-          <a:lnRef idx="2">
-            <a:schemeClr val="accent1">
-              <a:shade val="50000"/>
-            </a:schemeClr>
-          </a:lnRef>
-          <a:fillRef idx="1">
-            <a:schemeClr val="accent1"/>
-          </a:fillRef>
-          <a:effectRef idx="0">
-            <a:schemeClr val="accent1"/>
-          </a:effectRef>
-          <a:fontRef idx="minor">
-            <a:schemeClr val="lt1"/>
-          </a:fontRef>
-        </p:style>
-        <p:txBody>
-          <a:bodyPr rtlCol="0" anchor="ctr"/>
-          <a:lstStyle/>
-          <a:p>
-            <a:pPr algn="ctr"/>
-            <a:endParaRPr lang="en-US"/>
-          </a:p>
-        </p:txBody>
-      </p:sp>
-      <p:sp>
-        <p:nvSpPr>
-          <p:cNvPr id="2" name="标题 1">
-            <a:extLst>
-              <a:ext uri="{FF2B5EF4-FFF2-40B4-BE49-F238E27FC236}">
-                <a16:creationId xmlns:a16="http://schemas.microsoft.com/office/drawing/2014/main" id="{45DECD4C-8063-7F7D-DB29-CA97D4C92700}"/>
-              </a:ext>
-            </a:extLst>
-          </p:cNvPr>
-          <p:cNvSpPr>
-            <a:spLocks noGrp="1"/>
-          </p:cNvSpPr>
-          <p:nvPr>
-            <p:ph type="title"/>
-          </p:nvPr>
-        </p:nvSpPr>
-        <p:spPr>
-          <a:xfrm>
-            <a:off x="411480" y="991443"/>
-            <a:ext cx="4443154" cy="1087819"/>
-          </a:xfrm>
-        </p:spPr>
-        <p:txBody>
-          <a:bodyPr anchor="b">
-            <a:normAutofit/>
-          </a:bodyPr>
-          <a:lstStyle/>
-          <a:p>
-            <a:r>
-              <a:rPr lang="en-US" altLang="zh-CN" sz="3400" b="1" dirty="0"/>
-              <a:t>Heatmap</a:t>
-            </a:r>
-            <a:endParaRPr lang="zh-CN" altLang="en-US" sz="3400" b="1" dirty="0"/>
-          </a:p>
-        </p:txBody>
-      </p:sp>
-      <p:sp>
-        <p:nvSpPr>
-          <p:cNvPr id="28" name="Rectangle 27">
-            <a:extLst>
-              <a:ext uri="{FF2B5EF4-FFF2-40B4-BE49-F238E27FC236}">
-                <a16:creationId xmlns:a16="http://schemas.microsoft.com/office/drawing/2014/main" id="{33AE4636-AEEC-45D6-84D4-7AC2DA48ECF8}"/>
-              </a:ext>
-              <a:ext uri="{C183D7F6-B498-43B3-948B-1728B52AA6E4}">
-                <adec:decorative xmlns:adec="http://schemas.microsoft.com/office/drawing/2017/decorative" val="1"/>
-              </a:ext>
-            </a:extLst>
-          </p:cNvPr>
-          <p:cNvSpPr>
-            <a:spLocks noGrp="1" noRot="1" noChangeAspect="1" noMove="1" noResize="1" noEditPoints="1" noAdjustHandles="1" noChangeArrowheads="1" noChangeShapeType="1" noTextEdit="1"/>
-          </p:cNvSpPr>
-          <p:nvPr>
-            <p:extLst>
-              <p:ext uri="{386F3935-93C4-4BCD-93E2-E3B085C9AB24}">
-                <p16:designElem xmlns:p16="http://schemas.microsoft.com/office/powerpoint/2015/main" val="1"/>
-              </p:ext>
-            </p:extLst>
-          </p:nvPr>
-        </p:nvSpPr>
-        <p:spPr>
-          <a:xfrm rot="5400000">
-            <a:off x="649223" y="387939"/>
-            <a:ext cx="73152" cy="548640"/>
-          </a:xfrm>
-          <a:prstGeom prst="rect">
-            <a:avLst/>
-          </a:prstGeom>
-          <a:solidFill>
-            <a:schemeClr val="accent2"/>
-          </a:solidFill>
-          <a:ln>
-            <a:noFill/>
-          </a:ln>
-        </p:spPr>
-        <p:style>
-          <a:lnRef idx="2">
-            <a:schemeClr val="accent1">
-              <a:shade val="50000"/>
-            </a:schemeClr>
-          </a:lnRef>
-          <a:fillRef idx="1">
-            <a:schemeClr val="accent1"/>
-          </a:fillRef>
-          <a:effectRef idx="0">
-            <a:schemeClr val="accent1"/>
-          </a:effectRef>
-          <a:fontRef idx="minor">
-            <a:schemeClr val="lt1"/>
-          </a:fontRef>
-        </p:style>
-        <p:txBody>
-          <a:bodyPr rtlCol="0" anchor="ctr"/>
-          <a:lstStyle/>
-          <a:p>
-            <a:pPr algn="ctr"/>
-            <a:endParaRPr lang="en-US">
-              <a:solidFill>
-                <a:prstClr val="white"/>
-              </a:solidFill>
-              <a:latin typeface="Calibri" panose="020F0502020204030204"/>
-            </a:endParaRPr>
-          </a:p>
-        </p:txBody>
-      </p:sp>
-      <p:sp>
-        <p:nvSpPr>
-          <p:cNvPr id="30" name="Rectangle 29">
-            <a:extLst>
-              <a:ext uri="{FF2B5EF4-FFF2-40B4-BE49-F238E27FC236}">
-                <a16:creationId xmlns:a16="http://schemas.microsoft.com/office/drawing/2014/main" id="{8D9CE0F4-2EB2-4F1F-8AAC-DB3571D9FE10}"/>
-              </a:ext>
-              <a:ext uri="{C183D7F6-B498-43B3-948B-1728B52AA6E4}">
-                <adec:decorative xmlns:adec="http://schemas.microsoft.com/office/drawing/2017/decorative" val="1"/>
-              </a:ext>
-            </a:extLst>
-          </p:cNvPr>
-          <p:cNvSpPr>
-            <a:spLocks noGrp="1" noRot="1" noChangeAspect="1" noMove="1" noResize="1" noEditPoints="1" noAdjustHandles="1" noChangeArrowheads="1" noChangeShapeType="1" noTextEdit="1"/>
-          </p:cNvSpPr>
-          <p:nvPr>
-            <p:extLst>
-              <p:ext uri="{386F3935-93C4-4BCD-93E2-E3B085C9AB24}">
-                <p16:designElem xmlns:p16="http://schemas.microsoft.com/office/powerpoint/2015/main" val="1"/>
-              </p:ext>
-            </p:extLst>
-          </p:nvPr>
-        </p:nvSpPr>
-        <p:spPr>
-          <a:xfrm>
-            <a:off x="411480" y="2285541"/>
-            <a:ext cx="4389120" cy="18288"/>
-          </a:xfrm>
-          <a:prstGeom prst="rect">
-            <a:avLst/>
-          </a:prstGeom>
-          <a:solidFill>
-            <a:srgbClr val="D5D5D5"/>
-          </a:solidFill>
-          <a:ln w="3175">
-            <a:noFill/>
-          </a:ln>
-          <a:effectLst/>
-        </p:spPr>
-        <p:style>
-          <a:lnRef idx="2">
-            <a:schemeClr val="accent1">
-              <a:shade val="50000"/>
-            </a:schemeClr>
-          </a:lnRef>
-          <a:fillRef idx="1">
-            <a:schemeClr val="accent1"/>
-          </a:fillRef>
-          <a:effectRef idx="0">
-            <a:schemeClr val="accent1"/>
-          </a:effectRef>
-          <a:fontRef idx="minor">
-            <a:schemeClr val="lt1"/>
-          </a:fontRef>
-        </p:style>
-        <p:txBody>
-          <a:bodyPr rtlCol="0" anchor="ctr"/>
-          <a:lstStyle/>
-          <a:p>
-            <a:pPr algn="ctr"/>
-            <a:endParaRPr lang="en-US">
-              <a:solidFill>
-                <a:prstClr val="white"/>
-              </a:solidFill>
-              <a:latin typeface="Calibri" panose="020F0502020204030204"/>
-            </a:endParaRPr>
-          </a:p>
-        </p:txBody>
-      </p:sp>
-      <p:sp>
-        <p:nvSpPr>
-          <p:cNvPr id="9" name="Content Placeholder 8">
-            <a:extLst>
-              <a:ext uri="{FF2B5EF4-FFF2-40B4-BE49-F238E27FC236}">
-                <a16:creationId xmlns:a16="http://schemas.microsoft.com/office/drawing/2014/main" id="{BC99AF29-964C-5F82-5668-9B87F5571FB9}"/>
-              </a:ext>
-            </a:extLst>
-          </p:cNvPr>
-          <p:cNvSpPr>
-            <a:spLocks noGrp="1"/>
-          </p:cNvSpPr>
-          <p:nvPr>
-            <p:ph idx="1"/>
-          </p:nvPr>
-        </p:nvSpPr>
-        <p:spPr>
-          <a:xfrm>
-            <a:off x="411480" y="2684095"/>
-            <a:ext cx="4443154" cy="3492868"/>
-          </a:xfrm>
-        </p:spPr>
-        <p:txBody>
-          <a:bodyPr>
-            <a:normAutofit fontScale="85000" lnSpcReduction="10000"/>
-          </a:bodyPr>
-          <a:lstStyle/>
-          <a:p>
-            <a:r>
-              <a:rPr lang="en-US" sz="1800" b="1" dirty="0"/>
-              <a:t>Higher temperatures tend to be associated with slightly lower crop yields across states. This is consistent with heat-stress effects on both crops, especially wheat.</a:t>
-            </a:r>
-          </a:p>
-          <a:p>
-            <a:r>
-              <a:rPr lang="en-US" altLang="zh-CN" sz="1800" b="1" dirty="0"/>
-              <a:t>Precipitation does not show a strong or consistent relationship with yields.</a:t>
-            </a:r>
-          </a:p>
-          <a:p>
-            <a:r>
-              <a:rPr lang="en-US" altLang="zh-CN" sz="1800" b="1" dirty="0"/>
-              <a:t>States with good conditions for one crop tend to have good conditions for the other.</a:t>
-            </a:r>
-          </a:p>
-          <a:p>
-            <a:r>
-              <a:rPr lang="en-US" altLang="zh-CN" sz="1800" b="1" dirty="0"/>
-              <a:t>Warmer years are slightly drier, but the relationship is weak and varies across states</a:t>
-            </a:r>
-          </a:p>
-          <a:p>
-            <a:r>
-              <a:rPr lang="en-US" altLang="zh-CN" sz="1800" b="1" dirty="0"/>
-              <a:t>Temperature is a more influential factor than precipitation for both crops, but neither variable alone is a strong predictor of yield — indicating complex interactions behind crop performance</a:t>
-            </a:r>
-            <a:endParaRPr lang="en-US" sz="1800" b="1" dirty="0"/>
-          </a:p>
-          <a:p>
-            <a:endParaRPr lang="en-US" sz="1800" b="1" dirty="0"/>
-          </a:p>
-        </p:txBody>
-      </p:sp>
-      <p:pic>
-        <p:nvPicPr>
-          <p:cNvPr id="5" name="内容占位符 4" descr="图表, 树状图&#10;&#10;AI 生成的内容可能不正确。">
-            <a:extLst>
-              <a:ext uri="{FF2B5EF4-FFF2-40B4-BE49-F238E27FC236}">
-                <a16:creationId xmlns:a16="http://schemas.microsoft.com/office/drawing/2014/main" id="{F59369AC-94C8-E8A1-3263-4FCF11ED56E3}"/>
-              </a:ext>
-            </a:extLst>
-          </p:cNvPr>
-          <p:cNvPicPr>
-            <a:picLocks noChangeAspect="1"/>
-          </p:cNvPicPr>
-          <p:nvPr/>
-        </p:nvPicPr>
-        <p:blipFill>
-          <a:blip r:embed="rId3">
-            <a:extLst>
-              <a:ext uri="{28A0092B-C50C-407E-A947-70E740481C1C}">
-                <a14:useLocalDpi xmlns:a14="http://schemas.microsoft.com/office/drawing/2010/main" val="0"/>
-              </a:ext>
-            </a:extLst>
-          </a:blip>
-          <a:stretch>
-            <a:fillRect/>
-          </a:stretch>
-        </p:blipFill>
-        <p:spPr>
-          <a:xfrm>
-            <a:off x="5021352" y="566839"/>
-            <a:ext cx="6903210" cy="5919502"/>
-          </a:xfrm>
-          <a:prstGeom prst="rect">
-            <a:avLst/>
-          </a:prstGeom>
-        </p:spPr>
-      </p:pic>
-    </p:spTree>
-    <p:extLst>
-      <p:ext uri="{BB962C8B-B14F-4D97-AF65-F5344CB8AC3E}">
-        <p14:creationId xmlns:p14="http://schemas.microsoft.com/office/powerpoint/2010/main" val="4237960083"/>
       </p:ext>
     </p:extLst>
   </p:cSld>

</xml_diff>

<commit_message>
final version presentation.pptx ,.pdf
</commit_message>
<xml_diff>
--- a/doc/yilong_xu_presentation.pptx
+++ b/doc/yilong_xu_presentation.pptx
@@ -603,52 +603,6 @@
           <a:bodyPr/>
           <a:lstStyle/>
           <a:p>
-            <a:r>
-              <a:rPr lang="en-US" altLang="zh-CN" b="1" dirty="0"/>
-              <a:t>California (CA): mild positive relationship, warmer years slightly increase corn yield.</a:t>
-            </a:r>
-          </a:p>
-          <a:p>
-            <a:r>
-              <a:rPr lang="en-US" altLang="zh-CN" b="1" dirty="0"/>
-              <a:t>Illinois (IL): weak or flat </a:t>
-            </a:r>
-            <a:r>
-              <a:rPr lang="en-US" altLang="zh-CN" b="1" dirty="0" err="1"/>
-              <a:t>trend,ideal</a:t>
-            </a:r>
-            <a:r>
-              <a:rPr lang="en-US" altLang="zh-CN" b="1" dirty="0"/>
-              <a:t> corn-growing climate makes yield less sensitive.</a:t>
-            </a:r>
-          </a:p>
-          <a:p>
-            <a:r>
-              <a:rPr lang="en-US" altLang="zh-CN" b="1" dirty="0"/>
-              <a:t>New York (NY): weak/slightly negative, temperature swings may hurt yield.</a:t>
-            </a:r>
-          </a:p>
-          <a:p>
-            <a:r>
-              <a:rPr lang="en-US" altLang="zh-CN" b="1" dirty="0"/>
-              <a:t>Texas (TX): </a:t>
-            </a:r>
-            <a:r>
-              <a:rPr lang="en-US" altLang="zh-CN" b="1" i="1" dirty="0"/>
-              <a:t>very weak</a:t>
-            </a:r>
-            <a:r>
-              <a:rPr lang="en-US" altLang="zh-CN" b="1" dirty="0"/>
-              <a:t> correlation, extreme heat does NOT help and may limit production.</a:t>
-            </a:r>
-          </a:p>
-          <a:p>
-            <a:r>
-              <a:rPr lang="en-US" altLang="zh-CN" b="1" dirty="0"/>
-              <a:t>Utah (UT): moderate positive trend, yield increases in warmer years.</a:t>
-            </a:r>
-          </a:p>
-          <a:p>
             <a:endParaRPr lang="zh-CN" altLang="en-US" b="1" dirty="0"/>
           </a:p>
         </p:txBody>
@@ -751,22 +705,7 @@
           <a:bodyPr/>
           <a:lstStyle/>
           <a:p>
-            <a:r>
-              <a:rPr lang="en-US" altLang="zh-CN" b="1" dirty="0"/>
-              <a:t>CA, UT and TX: negative slop, hotter years reduce wheat yield</a:t>
-            </a:r>
-          </a:p>
-          <a:p>
-            <a:r>
-              <a:rPr lang="en-US" altLang="zh-CN" b="1" dirty="0"/>
-              <a:t>IL and NY: positive slope, warmer years increase wheat yield</a:t>
-            </a:r>
-          </a:p>
-          <a:p>
-            <a:r>
-              <a:rPr lang="en-US" altLang="zh-CN" b="1" dirty="0"/>
-              <a:t>Interpretation: Wheat tends to prefer cooler temp. When temp is moderately warm, yield increases. When heat becomes extreme, yield decreases.</a:t>
-            </a:r>
+            <a:endParaRPr lang="en-US" altLang="zh-CN" b="1" dirty="0"/>
           </a:p>
         </p:txBody>
       </p:sp>
@@ -4773,54 +4712,51 @@
         </p:nvSpPr>
         <p:spPr>
           <a:xfrm>
-            <a:off x="411480" y="2684095"/>
-            <a:ext cx="4443154" cy="3492868"/>
+            <a:off x="92503" y="2326826"/>
+            <a:ext cx="4928850" cy="3891422"/>
           </a:xfrm>
         </p:spPr>
         <p:txBody>
           <a:bodyPr>
-            <a:normAutofit fontScale="85000" lnSpcReduction="10000"/>
+            <a:noAutofit/>
           </a:bodyPr>
           <a:lstStyle/>
           <a:p>
             <a:r>
-              <a:rPr lang="en-US" sz="1800" b="1" dirty="0"/>
-              <a:t>Higher temperatures tend to be associated with slightly lower crop yields across states. This is consistent with heat-stress effects on both crops, especially wheat.</a:t>
-            </a:r>
-          </a:p>
-          <a:p>
-            <a:r>
-              <a:rPr lang="en-US" altLang="zh-CN" sz="1800" b="1" dirty="0"/>
-              <a:t>Precipitation does not show a strong or consistent relationship with yields.</a:t>
-            </a:r>
-          </a:p>
-          <a:p>
-            <a:r>
-              <a:rPr lang="en-US" altLang="zh-CN" sz="1800" b="1" dirty="0"/>
-              <a:t>States with good conditions for one crop tend to have good conditions for the other.</a:t>
-            </a:r>
-          </a:p>
-          <a:p>
-            <a:r>
-              <a:rPr lang="en-US" altLang="zh-CN" sz="1800" b="1" dirty="0"/>
-              <a:t>Warmer years are slightly drier, but the relationship is weak and varies across states</a:t>
-            </a:r>
-          </a:p>
-          <a:p>
-            <a:r>
-              <a:rPr lang="en-US" altLang="zh-CN" sz="1800" b="1" dirty="0"/>
-              <a:t>Temperature is a more influential factor than precipitation for both crops, but neither variable alone is a strong predictor of yield — indicating complex interactions behind crop performance</a:t>
-            </a:r>
-            <a:endParaRPr lang="en-US" sz="1800" b="1" dirty="0"/>
-          </a:p>
-          <a:p>
-            <a:endParaRPr lang="en-US" sz="1800" b="1" dirty="0"/>
+              <a:rPr lang="en-US" sz="1400" b="1" dirty="0"/>
+              <a:t>Corn and wheat yields are strongly positively correlated (r ≈ 0.76), indicating that years with higher corn yields tend to also have higher wheat yields across states.</a:t>
+            </a:r>
+          </a:p>
+          <a:p>
+            <a:r>
+              <a:rPr lang="en-US" altLang="zh-CN" sz="1400" b="1" dirty="0"/>
+              <a:t>Average temperature shows very weak correlations with both corn (r ≈ 0.08) and wheat yields (r ≈ −0.04), suggesting no strong linear relationship between temperature and crop yields at this aggregated scale.</a:t>
+            </a:r>
+          </a:p>
+          <a:p>
+            <a:r>
+              <a:rPr lang="en-US" altLang="zh-CN" sz="1400" b="1" dirty="0"/>
+              <a:t>Total precipitation is weakly negatively correlated with both corn (r ≈ −0.11) and wheat yields (r ≈ −0.22), indicating a slight tendency for higher precipitation to coincide with lower yields, though the relationship is modest.</a:t>
+            </a:r>
+          </a:p>
+          <a:p>
+            <a:r>
+              <a:rPr lang="en-US" altLang="zh-CN" sz="1400" b="1" dirty="0"/>
+              <a:t>Temperature and precipitation are weakly negatively correlated (r ≈ −0.21), implying that warmer years tend to be slightly drier, but the relationship is not strong</a:t>
+            </a:r>
+          </a:p>
+          <a:p>
+            <a:r>
+              <a:rPr lang="en-US" altLang="zh-CN" sz="1400" b="1" dirty="0"/>
+              <a:t>Overall, neither temperature nor precipitation alone is a strong predictor of crop yield, highlighting that crop performance is influenced by more complex interactions beyond simple annual climate averages</a:t>
+            </a:r>
+            <a:endParaRPr lang="en-US" sz="1400" b="1" dirty="0"/>
           </a:p>
         </p:txBody>
       </p:sp>
       <p:pic>
         <p:nvPicPr>
-          <p:cNvPr id="5" name="内容占位符 4" descr="图表, 树状图&#10;&#10;AI 生成的内容可能不正确。">
+          <p:cNvPr id="5" name="内容占位符 4">
             <a:extLst>
               <a:ext uri="{FF2B5EF4-FFF2-40B4-BE49-F238E27FC236}">
                 <a16:creationId xmlns:a16="http://schemas.microsoft.com/office/drawing/2014/main" id="{F59369AC-94C8-E8A1-3263-4FCF11ED56E3}"/>
@@ -4840,14 +4776,13 @@
               </a:ext>
             </a:extLst>
           </a:blip>
-          <a:stretch>
-            <a:fillRect/>
-          </a:stretch>
+          <a:srcRect/>
+          <a:stretch/>
         </p:blipFill>
         <p:spPr>
           <a:xfrm>
-            <a:off x="5021352" y="566839"/>
-            <a:ext cx="6903210" cy="5919502"/>
+            <a:off x="5021352" y="568071"/>
+            <a:ext cx="6903210" cy="5917037"/>
           </a:xfrm>
           <a:prstGeom prst="rect">
             <a:avLst/>
@@ -5568,7 +5503,7 @@
         </p:blipFill>
         <p:spPr>
           <a:xfrm>
-            <a:off x="6006593" y="4190999"/>
+            <a:off x="5403252" y="3188527"/>
             <a:ext cx="5138928" cy="2312517"/>
           </a:xfrm>
           <a:prstGeom prst="rect">
@@ -5602,7 +5537,7 @@
         </p:blipFill>
         <p:spPr>
           <a:xfrm>
-            <a:off x="5049132" y="1393457"/>
+            <a:off x="5403252" y="1303895"/>
             <a:ext cx="6703955" cy="1583210"/>
           </a:xfrm>
           <a:prstGeom prst="rect">
@@ -5807,7 +5742,7 @@
         </p:nvSpPr>
         <p:spPr>
           <a:xfrm>
-            <a:off x="5297762" y="329184"/>
+            <a:off x="5297593" y="222858"/>
             <a:ext cx="6251110" cy="1783080"/>
           </a:xfrm>
         </p:spPr>
@@ -6329,7 +6264,7 @@
         </p:nvSpPr>
         <p:spPr>
           <a:xfrm>
-            <a:off x="5297762" y="2530549"/>
+            <a:off x="5297593" y="2424223"/>
             <a:ext cx="6251110" cy="3659939"/>
           </a:xfrm>
         </p:spPr>
@@ -6349,7 +6284,7 @@
             </a:r>
             <a:r>
               <a:rPr lang="en-US" altLang="zh-CN" sz="1600" b="1" dirty="0"/>
-              <a:t>To examine how temperature and precipitation relate to corn and wheat yields across different U.S. states from 2015–2024</a:t>
+              <a:t>To examine how temperature and precipitation relate to corn and wheat yields across different U.S. states from 1970–2024</a:t>
             </a:r>
           </a:p>
           <a:p>
@@ -6469,7 +6404,7 @@
             </a:br>
             <a:r>
               <a:rPr lang="en-US" altLang="zh-CN" sz="1800" b="1" dirty="0"/>
-              <a:t>Date Range: 2015/01/01- 2024-12-31</a:t>
+              <a:t>Date Range: 1970/01/01- 2024-12-31</a:t>
             </a:r>
             <a:endParaRPr lang="zh-CN" altLang="en-US" sz="1800" b="1" dirty="0"/>
           </a:p>
@@ -6491,7 +6426,7 @@
             <p:ph idx="1"/>
             <p:extLst>
               <p:ext uri="{D42A27DB-BD31-4B8C-83A1-F6EECF244321}">
-                <p14:modId xmlns:p14="http://schemas.microsoft.com/office/powerpoint/2010/main" val="4125152846"/>
+                <p14:modId xmlns:p14="http://schemas.microsoft.com/office/powerpoint/2010/main" val="45353556"/>
               </p:ext>
             </p:extLst>
           </p:nvPr>
@@ -6710,7 +6645,7 @@
                     <a:p>
                       <a:r>
                         <a:rPr lang="en-US" altLang="zh-CN" sz="1400" b="1" dirty="0"/>
-                        <a:t>2400 rows,</a:t>
+                        <a:t>13000+ rows,</a:t>
                       </a:r>
                     </a:p>
                     <a:p>
@@ -6837,7 +6772,7 @@
                     <a:p>
                       <a:r>
                         <a:rPr lang="en-US" altLang="zh-CN" sz="1400" b="1" dirty="0"/>
-                        <a:t>2600 rows,</a:t>
+                        <a:t>22000+ rows,</a:t>
                       </a:r>
                     </a:p>
                     <a:p>
@@ -6962,7 +6897,7 @@
                     <a:p>
                       <a:r>
                         <a:rPr lang="en-US" altLang="zh-CN" sz="1400" b="1" dirty="0"/>
-                        <a:t>950 rows, </a:t>
+                        <a:t>6000+ rows, </a:t>
                       </a:r>
                     </a:p>
                     <a:p>
@@ -7085,7 +7020,7 @@
       </p:sp>
       <p:pic>
         <p:nvPicPr>
-          <p:cNvPr id="5" name="内容占位符 4" descr="图表, 折线图&#10;&#10;AI 生成的内容可能不正确。">
+          <p:cNvPr id="5" name="内容占位符 4">
             <a:extLst>
               <a:ext uri="{FF2B5EF4-FFF2-40B4-BE49-F238E27FC236}">
                 <a16:creationId xmlns:a16="http://schemas.microsoft.com/office/drawing/2014/main" id="{41BCAA0B-CF18-72AF-7680-90EB10806504}"/>
@@ -7105,14 +7040,12 @@
               </a:ext>
             </a:extLst>
           </a:blip>
-          <a:srcRect l="1196" r="1191" b="-3"/>
-          <a:stretch>
-            <a:fillRect/>
-          </a:stretch>
+          <a:srcRect l="1195" r="1195"/>
+          <a:stretch/>
         </p:blipFill>
         <p:spPr>
           <a:xfrm>
-            <a:off x="-88560" y="1728216"/>
+            <a:off x="-377725" y="1673692"/>
             <a:ext cx="7974957" cy="4902097"/>
           </a:xfrm>
           <a:prstGeom prst="rect">
@@ -7327,37 +7260,93 @@
         </p:nvSpPr>
         <p:spPr>
           <a:xfrm>
-            <a:off x="7411453" y="2478024"/>
-            <a:ext cx="3872243" cy="3694176"/>
+            <a:off x="6943061" y="2018805"/>
+            <a:ext cx="5248940" cy="4477688"/>
           </a:xfrm>
         </p:spPr>
         <p:txBody>
           <a:bodyPr anchor="ctr">
-            <a:normAutofit/>
+            <a:normAutofit fontScale="85000" lnSpcReduction="20000"/>
           </a:bodyPr>
           <a:lstStyle/>
           <a:p>
             <a:r>
               <a:rPr lang="en-US" sz="1800" b="1" dirty="0"/>
-              <a:t>All five states (CA, IL, NY, TX, UT) show mild warming trends, but not uniformly.</a:t>
-            </a:r>
-          </a:p>
-          <a:p>
+              <a:t>All five states exhibit a clear long-term warming trend from 1970 to 2024, although the rate and magnitude differ by state.</a:t>
+            </a:r>
+          </a:p>
+          <a:p>
+            <a:r>
+              <a:rPr lang="en-US" sz="1800" b="1" dirty="0">
+                <a:solidFill>
+                  <a:srgbClr val="D52425"/>
+                </a:solidFill>
+              </a:rPr>
+              <a:t>Texas</a:t>
+            </a:r>
             <a:r>
               <a:rPr lang="en-US" sz="1800" b="1" dirty="0"/>
-              <a:t>California and Texas have the warmest average temperatures (17–20°C range)</a:t>
-            </a:r>
-          </a:p>
-          <a:p>
+              <a:t> consistently records the highest average temperatures, remaining well above other states throughout the entire period and showing a persistent upward trend, especially after the late 1990s</a:t>
+            </a:r>
+          </a:p>
+          <a:p>
+            <a:r>
+              <a:rPr lang="en-US" altLang="zh-CN" sz="1800" b="1" dirty="0">
+                <a:solidFill>
+                  <a:srgbClr val="1E76B4"/>
+                </a:solidFill>
+              </a:rPr>
+              <a:t>California</a:t>
+            </a:r>
             <a:r>
               <a:rPr lang="en-US" altLang="zh-CN" sz="1800" b="1" dirty="0"/>
-              <a:t>Illinois and New York stay cooler (9–14°C range)</a:t>
-            </a:r>
-          </a:p>
-          <a:p>
+              <a:t> also shows sustained warming, with relatively high average temperatures compared to northern states and a noticeable increase since the 1980s, though with some mid-period variability</a:t>
+            </a:r>
+          </a:p>
+          <a:p>
+            <a:r>
+              <a:rPr lang="en-US" sz="1800" b="1" dirty="0">
+                <a:solidFill>
+                  <a:srgbClr val="FF7C09"/>
+                </a:solidFill>
+              </a:rPr>
+              <a:t>Illinois</a:t>
+            </a:r>
             <a:r>
               <a:rPr lang="en-US" sz="1800" b="1" dirty="0"/>
-              <a:t>Utah shows the largest year-to-year fluctuation, indicating higher climate variability</a:t>
+              <a:t> and </a:t>
+            </a:r>
+            <a:r>
+              <a:rPr lang="en-US" sz="1800" b="1" dirty="0">
+                <a:solidFill>
+                  <a:srgbClr val="279E27"/>
+                </a:solidFill>
+              </a:rPr>
+              <a:t>New York </a:t>
+            </a:r>
+            <a:r>
+              <a:rPr lang="en-US" sz="1800" b="1" dirty="0"/>
+              <a:t>remain cooler overall, but both display gradual warming over time, with more pronounced increases in the most recent decades (post-2000)</a:t>
+            </a:r>
+          </a:p>
+          <a:p>
+            <a:r>
+              <a:rPr lang="en-US" sz="1800" b="1" dirty="0">
+                <a:solidFill>
+                  <a:srgbClr val="9366BC"/>
+                </a:solidFill>
+              </a:rPr>
+              <a:t>Utah</a:t>
+            </a:r>
+            <a:r>
+              <a:rPr lang="en-US" sz="1800" b="1" dirty="0"/>
+              <a:t> demonstrates the greatest year-to-year variability, with sharper short-term fluctuations around its warming trend, suggesting higher climate variability relative to the other states</a:t>
+            </a:r>
+          </a:p>
+          <a:p>
+            <a:r>
+              <a:rPr lang="en-US" sz="1800" b="1" dirty="0"/>
+              <a:t>The warming signal becomes more pronounced after 2000, indicating accelerated temperature increases across most states in the last two decades</a:t>
             </a:r>
           </a:p>
         </p:txBody>
@@ -7392,7 +7381,7 @@
           <a:p>
             <a:r>
               <a:rPr lang="en-US" altLang="zh-CN" sz="3600" b="1" dirty="0"/>
-              <a:t>Temperature Trends Across States (2015–2024)</a:t>
+              <a:t>Temperature Trends Across States (1970–2024)</a:t>
             </a:r>
             <a:endParaRPr lang="zh-CN" altLang="en-US" sz="3600" b="1" dirty="0"/>
           </a:p>
@@ -7590,7 +7579,7 @@
       </p:sp>
       <p:pic>
         <p:nvPicPr>
-          <p:cNvPr id="7" name="图片 6" descr="图表, 折线图&#10;&#10;AI 生成的内容可能不正确。">
+          <p:cNvPr id="7" name="图片 6">
             <a:extLst>
               <a:ext uri="{FF2B5EF4-FFF2-40B4-BE49-F238E27FC236}">
                 <a16:creationId xmlns:a16="http://schemas.microsoft.com/office/drawing/2014/main" id="{317CD92A-998D-AE7B-1926-EB6636096FBB}"/>
@@ -7610,15 +7599,13 @@
               </a:ext>
             </a:extLst>
           </a:blip>
-          <a:srcRect l="2389" r="-3" b="-3"/>
-          <a:stretch>
-            <a:fillRect/>
-          </a:stretch>
+          <a:srcRect l="1195" r="1195"/>
+          <a:stretch/>
         </p:blipFill>
         <p:spPr>
           <a:xfrm>
-            <a:off x="0" y="1863852"/>
-            <a:ext cx="8008181" cy="4922520"/>
+            <a:off x="-217007" y="1861193"/>
+            <a:ext cx="8159528" cy="5015551"/>
           </a:xfrm>
           <a:prstGeom prst="rect">
             <a:avLst/>
@@ -7844,7 +7831,7 @@
           <a:p>
             <a:r>
               <a:rPr lang="en-US" altLang="zh-CN" sz="3600" b="1" dirty="0"/>
-              <a:t>Precipitation Trends (2015–2024)</a:t>
+              <a:t>Precipitation Trends (1970–2024)</a:t>
             </a:r>
             <a:endParaRPr lang="zh-CN" altLang="en-US" sz="3600" b="1" dirty="0"/>
           </a:p>
@@ -7960,44 +7947,96 @@
         </p:nvSpPr>
         <p:spPr>
           <a:xfrm>
-            <a:off x="7411453" y="2478024"/>
-            <a:ext cx="3872243" cy="3694176"/>
+            <a:off x="7198243" y="2405112"/>
+            <a:ext cx="4848446" cy="4144544"/>
           </a:xfrm>
         </p:spPr>
         <p:txBody>
           <a:bodyPr anchor="ctr">
-            <a:normAutofit lnSpcReduction="10000"/>
+            <a:normAutofit fontScale="92500" lnSpcReduction="20000"/>
           </a:bodyPr>
           <a:lstStyle/>
           <a:p>
             <a:r>
               <a:rPr lang="en-US" altLang="zh-CN" sz="1400" b="1" dirty="0"/>
-              <a:t>Precipitation levels differ widely across states. Texas (TX) and New York (NY) have the highest rainfall, while California (CA) and Utah (UT) experience consistently dry conditions</a:t>
-            </a:r>
-          </a:p>
-          <a:p>
+              <a:t>Total precipitation exhibits substantial year-to-year variability across all five states, with no smooth or uniform long-term trend comparable to temperature</a:t>
+            </a:r>
+          </a:p>
+          <a:p>
+            <a:r>
+              <a:rPr lang="en-US" altLang="zh-CN" sz="1400" b="1" dirty="0">
+                <a:solidFill>
+                  <a:srgbClr val="279E27"/>
+                </a:solidFill>
+              </a:rPr>
+              <a:t>New York </a:t>
+            </a:r>
             <a:r>
               <a:rPr lang="en-US" altLang="zh-CN" sz="1400" b="1" dirty="0"/>
-              <a:t>Texas shows the strongest volatility, swinging between very wet and very dry years, indicating strong influence from extremes such as droughts and heavy storms.</a:t>
-            </a:r>
-          </a:p>
-          <a:p>
+              <a:t>and </a:t>
+            </a:r>
+            <a:r>
+              <a:rPr lang="en-US" altLang="zh-CN" sz="1400" b="1" dirty="0">
+                <a:solidFill>
+                  <a:srgbClr val="D52425"/>
+                </a:solidFill>
+              </a:rPr>
+              <a:t>Texas</a:t>
+            </a:r>
             <a:r>
               <a:rPr lang="en-US" altLang="zh-CN" sz="1400" b="1" dirty="0"/>
-              <a:t>New York also fluctuates, but the changes are less dramatic compared to Texas</a:t>
-            </a:r>
-          </a:p>
-          <a:p>
+              <a:t> generally experience higher annual precipitation totals, frequently exceeding other states, but both also show pronounced fluctuations, including occasional extreme wet years.</a:t>
+            </a:r>
+          </a:p>
+          <a:p>
+            <a:r>
+              <a:rPr lang="en-US" altLang="zh-CN" sz="1400" b="1" dirty="0">
+                <a:solidFill>
+                  <a:srgbClr val="FF7C09"/>
+                </a:solidFill>
+              </a:rPr>
+              <a:t>Illinois</a:t>
+            </a:r>
             <a:r>
               <a:rPr lang="en-US" altLang="zh-CN" sz="1400" b="1" dirty="0"/>
-              <a:t>Illinois has moderate and relatively stable precipitation, without extreme annual swings</a:t>
-            </a:r>
-          </a:p>
-          <a:p>
+              <a:t> displays moderate precipitation levels with noticeable interannual variability, but without a clear long-term increasing or decreasing trend across the full period</a:t>
+            </a:r>
+          </a:p>
+          <a:p>
+            <a:r>
+              <a:rPr lang="en-US" altLang="zh-CN" sz="1400" b="1" dirty="0">
+                <a:solidFill>
+                  <a:srgbClr val="1E76B4"/>
+                </a:solidFill>
+              </a:rPr>
+              <a:t>California</a:t>
+            </a:r>
             <a:r>
               <a:rPr lang="en-US" altLang="zh-CN" sz="1400" b="1" dirty="0"/>
-              <a:t>California and Utah remain low-precipitation states, with smaller overall variations, reflecting their arid climates</a:t>
-            </a:r>
+              <a:t> remains consistently the driest state, with lower total precipitation values throughout the time series and sharp fluctuations that highlight its sensitivity to wet and dry years</a:t>
+            </a:r>
+          </a:p>
+          <a:p>
+            <a:r>
+              <a:rPr lang="en-US" altLang="zh-CN" sz="1400" b="1" dirty="0">
+                <a:solidFill>
+                  <a:srgbClr val="9366BC"/>
+                </a:solidFill>
+              </a:rPr>
+              <a:t>Utah</a:t>
+            </a:r>
+            <a:r>
+              <a:rPr lang="en-US" altLang="zh-CN" sz="1400" b="1" dirty="0"/>
+              <a:t> records relatively low to moderate precipitation, with pronounced variability but no persistent long-term trend, suggesting precipitation changes are dominated by short-term climate variability rather than gradual shifts</a:t>
+            </a:r>
+          </a:p>
+          <a:p>
+            <a:r>
+              <a:rPr lang="en-US" altLang="zh-CN" sz="1400" b="1" dirty="0"/>
+              <a:t>Compared to temperature trends, precipitation patterns are more irregular and episodic, indicating weaker long-term signals and stronger influence of year-specific climate conditions</a:t>
+            </a:r>
+          </a:p>
+          <a:p>
             <a:endParaRPr lang="en-US" sz="1400" b="1" dirty="0"/>
           </a:p>
         </p:txBody>
@@ -8108,7 +8147,7 @@
       </p:sp>
       <p:pic>
         <p:nvPicPr>
-          <p:cNvPr id="21" name="图片 20" descr="图表, 散点图&#10;&#10;AI 生成的内容可能不正确。">
+          <p:cNvPr id="21" name="图片 20">
             <a:extLst>
               <a:ext uri="{FF2B5EF4-FFF2-40B4-BE49-F238E27FC236}">
                 <a16:creationId xmlns:a16="http://schemas.microsoft.com/office/drawing/2014/main" id="{1AD60CE1-F63A-A8FC-A2CD-9E94EB912B9C}"/>
@@ -8128,10 +8167,8 @@
               </a:ext>
             </a:extLst>
           </a:blip>
-          <a:srcRect l="21" r="3" b="3"/>
-          <a:stretch>
-            <a:fillRect/>
-          </a:stretch>
+          <a:srcRect l="10" r="10"/>
+          <a:stretch/>
         </p:blipFill>
         <p:spPr>
           <a:xfrm>
@@ -8145,7 +8182,7 @@
       </p:pic>
       <p:pic>
         <p:nvPicPr>
-          <p:cNvPr id="38" name="图片 37" descr="图表, 散点图&#10;&#10;AI 生成的内容可能不正确。">
+          <p:cNvPr id="38" name="图片 37">
             <a:extLst>
               <a:ext uri="{FF2B5EF4-FFF2-40B4-BE49-F238E27FC236}">
                 <a16:creationId xmlns:a16="http://schemas.microsoft.com/office/drawing/2014/main" id="{6596321F-CAF6-AC06-62D8-3D4D8F22C8B3}"/>
@@ -8165,14 +8202,12 @@
               </a:ext>
             </a:extLst>
           </a:blip>
-          <a:srcRect b="3553"/>
-          <a:stretch>
-            <a:fillRect/>
-          </a:stretch>
+          <a:srcRect t="1777" b="1777"/>
+          <a:stretch/>
         </p:blipFill>
         <p:spPr>
           <a:xfrm>
-            <a:off x="3703413" y="842243"/>
+            <a:off x="3757048" y="788552"/>
             <a:ext cx="3811271" cy="2756884"/>
           </a:xfrm>
           <a:prstGeom prst="rect">
@@ -8182,10 +8217,10 @@
       </p:pic>
       <p:pic>
         <p:nvPicPr>
-          <p:cNvPr id="40" name="图片 39" descr="图表, 散点图&#10;&#10;AI 生成的内容可能不正确。">
-            <a:extLst>
-              <a:ext uri="{FF2B5EF4-FFF2-40B4-BE49-F238E27FC236}">
-                <a16:creationId xmlns:a16="http://schemas.microsoft.com/office/drawing/2014/main" id="{64A15904-BF3B-715A-CD8C-8099B5D6557E}"/>
+          <p:cNvPr id="46" name="图片 45">
+            <a:extLst>
+              <a:ext uri="{FF2B5EF4-FFF2-40B4-BE49-F238E27FC236}">
+                <a16:creationId xmlns:a16="http://schemas.microsoft.com/office/drawing/2014/main" id="{23E159A7-91EC-2523-1836-EACF68AD3A62}"/>
               </a:ext>
             </a:extLst>
           </p:cNvPr>
@@ -8202,89 +8237,13 @@
               </a:ext>
             </a:extLst>
           </a:blip>
-          <a:srcRect l="4010" r="3590" b="-3"/>
-          <a:stretch>
-            <a:fillRect/>
-          </a:stretch>
+          <a:srcRect t="1615" b="1615"/>
+          <a:stretch/>
         </p:blipFill>
         <p:spPr>
           <a:xfrm>
-            <a:off x="4029741" y="3789140"/>
-            <a:ext cx="3396390" cy="2756884"/>
-          </a:xfrm>
-          <a:prstGeom prst="rect">
-            <a:avLst/>
-          </a:prstGeom>
-        </p:spPr>
-      </p:pic>
-      <p:pic>
-        <p:nvPicPr>
-          <p:cNvPr id="46" name="图片 45" descr="图表, 散点图&#10;&#10;AI 生成的内容可能不正确。">
-            <a:extLst>
-              <a:ext uri="{FF2B5EF4-FFF2-40B4-BE49-F238E27FC236}">
-                <a16:creationId xmlns:a16="http://schemas.microsoft.com/office/drawing/2014/main" id="{23E159A7-91EC-2523-1836-EACF68AD3A62}"/>
-              </a:ext>
-            </a:extLst>
-          </p:cNvPr>
-          <p:cNvPicPr>
-            <a:picLocks noChangeAspect="1"/>
-          </p:cNvPicPr>
-          <p:nvPr/>
-        </p:nvPicPr>
-        <p:blipFill>
-          <a:blip r:embed="rId6">
-            <a:extLst>
-              <a:ext uri="{28A0092B-C50C-407E-A947-70E740481C1C}">
-                <a14:useLocalDpi xmlns:a14="http://schemas.microsoft.com/office/drawing/2010/main" val="0"/>
-              </a:ext>
-            </a:extLst>
-          </a:blip>
-          <a:srcRect b="3230"/>
-          <a:stretch>
-            <a:fillRect/>
-          </a:stretch>
-        </p:blipFill>
-        <p:spPr>
-          <a:xfrm>
-            <a:off x="7752459" y="3789140"/>
-            <a:ext cx="3798529" cy="2756884"/>
-          </a:xfrm>
-          <a:prstGeom prst="rect">
-            <a:avLst/>
-          </a:prstGeom>
-        </p:spPr>
-      </p:pic>
-      <p:pic>
-        <p:nvPicPr>
-          <p:cNvPr id="44" name="图片 43" descr="图表, 散点图&#10;&#10;AI 生成的内容可能不正确。">
-            <a:extLst>
-              <a:ext uri="{FF2B5EF4-FFF2-40B4-BE49-F238E27FC236}">
-                <a16:creationId xmlns:a16="http://schemas.microsoft.com/office/drawing/2014/main" id="{36907C6E-105C-935F-47F0-C2915F2742D6}"/>
-              </a:ext>
-            </a:extLst>
-          </p:cNvPr>
-          <p:cNvPicPr>
-            <a:picLocks noChangeAspect="1"/>
-          </p:cNvPicPr>
-          <p:nvPr/>
-        </p:nvPicPr>
-        <p:blipFill>
-          <a:blip r:embed="rId7">
-            <a:extLst>
-              <a:ext uri="{28A0092B-C50C-407E-A947-70E740481C1C}">
-                <a14:useLocalDpi xmlns:a14="http://schemas.microsoft.com/office/drawing/2010/main" val="0"/>
-              </a:ext>
-            </a:extLst>
-          </a:blip>
-          <a:srcRect l="7602" r="-3" b="-3"/>
-          <a:stretch>
-            <a:fillRect/>
-          </a:stretch>
-        </p:blipFill>
-        <p:spPr>
-          <a:xfrm>
-            <a:off x="341883" y="842243"/>
-            <a:ext cx="3548257" cy="2880144"/>
+            <a:off x="7752459" y="3862123"/>
+            <a:ext cx="3827807" cy="2778133"/>
           </a:xfrm>
           <a:prstGeom prst="rect">
             <a:avLst/>
@@ -8348,8 +8307,8 @@
         </p:nvSpPr>
         <p:spPr>
           <a:xfrm>
-            <a:off x="7752459" y="1201110"/>
-            <a:ext cx="4186537" cy="738664"/>
+            <a:off x="7890298" y="1485785"/>
+            <a:ext cx="3552127" cy="738664"/>
           </a:xfrm>
           <a:prstGeom prst="rect">
             <a:avLst/>
@@ -8370,6 +8329,78 @@
           </a:p>
         </p:txBody>
       </p:sp>
+      <p:pic>
+        <p:nvPicPr>
+          <p:cNvPr id="5" name="图片 4" descr="图表, 散点图&#10;&#10;AI 生成的内容可能不正确。">
+            <a:extLst>
+              <a:ext uri="{FF2B5EF4-FFF2-40B4-BE49-F238E27FC236}">
+                <a16:creationId xmlns:a16="http://schemas.microsoft.com/office/drawing/2014/main" id="{F32B6FD3-BBC9-322F-37A5-6057F764CA07}"/>
+              </a:ext>
+            </a:extLst>
+          </p:cNvPr>
+          <p:cNvPicPr>
+            <a:picLocks noChangeAspect="1"/>
+          </p:cNvPicPr>
+          <p:nvPr/>
+        </p:nvPicPr>
+        <p:blipFill>
+          <a:blip r:embed="rId6">
+            <a:extLst>
+              <a:ext uri="{28A0092B-C50C-407E-A947-70E740481C1C}">
+                <a14:useLocalDpi xmlns:a14="http://schemas.microsoft.com/office/drawing/2010/main" val="0"/>
+              </a:ext>
+            </a:extLst>
+          </a:blip>
+          <a:stretch>
+            <a:fillRect/>
+          </a:stretch>
+        </p:blipFill>
+        <p:spPr>
+          <a:xfrm>
+            <a:off x="74428" y="788552"/>
+            <a:ext cx="3703414" cy="2777561"/>
+          </a:xfrm>
+          <a:prstGeom prst="rect">
+            <a:avLst/>
+          </a:prstGeom>
+        </p:spPr>
+      </p:pic>
+      <p:pic>
+        <p:nvPicPr>
+          <p:cNvPr id="7" name="图片 6" descr="图表, 散点图&#10;&#10;AI 生成的内容可能不正确。">
+            <a:extLst>
+              <a:ext uri="{FF2B5EF4-FFF2-40B4-BE49-F238E27FC236}">
+                <a16:creationId xmlns:a16="http://schemas.microsoft.com/office/drawing/2014/main" id="{F80C1B0B-39E2-B248-5F28-51B2ED6D2B92}"/>
+              </a:ext>
+            </a:extLst>
+          </p:cNvPr>
+          <p:cNvPicPr>
+            <a:picLocks noChangeAspect="1"/>
+          </p:cNvPicPr>
+          <p:nvPr/>
+        </p:nvPicPr>
+        <p:blipFill>
+          <a:blip r:embed="rId7">
+            <a:extLst>
+              <a:ext uri="{28A0092B-C50C-407E-A947-70E740481C1C}">
+                <a14:useLocalDpi xmlns:a14="http://schemas.microsoft.com/office/drawing/2010/main" val="0"/>
+              </a:ext>
+            </a:extLst>
+          </a:blip>
+          <a:stretch>
+            <a:fillRect/>
+          </a:stretch>
+        </p:blipFill>
+        <p:spPr>
+          <a:xfrm>
+            <a:off x="3741852" y="3747213"/>
+            <a:ext cx="4010607" cy="3007955"/>
+          </a:xfrm>
+          <a:prstGeom prst="rect">
+            <a:avLst/>
+          </a:prstGeom>
+        </p:spPr>
+      </p:pic>
     </p:spTree>
     <p:extLst>
       <p:ext uri="{BB962C8B-B14F-4D97-AF65-F5344CB8AC3E}">
@@ -8476,7 +8507,7 @@
       </p:sp>
       <p:pic>
         <p:nvPicPr>
-          <p:cNvPr id="10" name="图片 9" descr="图表, 散点图&#10;&#10;AI 生成的内容可能不正确。">
+          <p:cNvPr id="10" name="图片 9">
             <a:extLst>
               <a:ext uri="{FF2B5EF4-FFF2-40B4-BE49-F238E27FC236}">
                 <a16:creationId xmlns:a16="http://schemas.microsoft.com/office/drawing/2014/main" id="{BB07C03D-EEF1-E0E4-CC9F-767972B3DEEC}"/>
@@ -8496,14 +8527,13 @@
               </a:ext>
             </a:extLst>
           </a:blip>
-          <a:stretch>
-            <a:fillRect/>
-          </a:stretch>
+          <a:srcRect/>
+          <a:stretch/>
         </p:blipFill>
         <p:spPr>
           <a:xfrm>
-            <a:off x="112942" y="880656"/>
-            <a:ext cx="3709841" cy="2782380"/>
+            <a:off x="112943" y="880656"/>
+            <a:ext cx="3709839" cy="2782380"/>
           </a:xfrm>
           <a:prstGeom prst="rect">
             <a:avLst/>
@@ -8512,7 +8542,7 @@
       </p:pic>
       <p:pic>
         <p:nvPicPr>
-          <p:cNvPr id="12" name="图片 11" descr="图表, 散点图&#10;&#10;AI 生成的内容可能不正确。">
+          <p:cNvPr id="12" name="图片 11">
             <a:extLst>
               <a:ext uri="{FF2B5EF4-FFF2-40B4-BE49-F238E27FC236}">
                 <a16:creationId xmlns:a16="http://schemas.microsoft.com/office/drawing/2014/main" id="{2E17481C-1D84-DD59-3C49-F37FA91476EA}"/>
@@ -8532,14 +8562,13 @@
               </a:ext>
             </a:extLst>
           </a:blip>
-          <a:stretch>
-            <a:fillRect/>
-          </a:stretch>
+          <a:srcRect/>
+          <a:stretch/>
         </p:blipFill>
         <p:spPr>
           <a:xfrm>
-            <a:off x="8032590" y="3785516"/>
-            <a:ext cx="3736697" cy="2802522"/>
+            <a:off x="8032591" y="3785516"/>
+            <a:ext cx="3736695" cy="2802522"/>
           </a:xfrm>
           <a:prstGeom prst="rect">
             <a:avLst/>
@@ -8548,7 +8577,7 @@
       </p:pic>
       <p:pic>
         <p:nvPicPr>
-          <p:cNvPr id="4" name="图片 3" descr="图表, 散点图&#10;&#10;AI 生成的内容可能不正确。">
+          <p:cNvPr id="4" name="图片 3">
             <a:extLst>
               <a:ext uri="{FF2B5EF4-FFF2-40B4-BE49-F238E27FC236}">
                 <a16:creationId xmlns:a16="http://schemas.microsoft.com/office/drawing/2014/main" id="{DC0F2A4D-25E7-E60B-387B-2739EB7CEC8C}"/>
@@ -8568,14 +8597,13 @@
               </a:ext>
             </a:extLst>
           </a:blip>
-          <a:stretch>
-            <a:fillRect/>
-          </a:stretch>
+          <a:srcRect/>
+          <a:stretch/>
         </p:blipFill>
         <p:spPr>
           <a:xfrm>
-            <a:off x="139799" y="3754576"/>
-            <a:ext cx="3736697" cy="2802521"/>
+            <a:off x="139800" y="3754576"/>
+            <a:ext cx="3736694" cy="2802521"/>
           </a:xfrm>
           <a:prstGeom prst="rect">
             <a:avLst/>
@@ -8584,7 +8612,7 @@
       </p:pic>
       <p:pic>
         <p:nvPicPr>
-          <p:cNvPr id="6" name="图片 5" descr="图表, 散点图&#10;&#10;AI 生成的内容可能不正确。">
+          <p:cNvPr id="6" name="图片 5">
             <a:extLst>
               <a:ext uri="{FF2B5EF4-FFF2-40B4-BE49-F238E27FC236}">
                 <a16:creationId xmlns:a16="http://schemas.microsoft.com/office/drawing/2014/main" id="{56A51388-6AE5-95A7-C7D8-9F7B789855C6}"/>
@@ -8604,14 +8632,13 @@
               </a:ext>
             </a:extLst>
           </a:blip>
-          <a:stretch>
-            <a:fillRect/>
-          </a:stretch>
+          <a:srcRect/>
+          <a:stretch/>
         </p:blipFill>
         <p:spPr>
           <a:xfrm>
-            <a:off x="3822783" y="888228"/>
-            <a:ext cx="3929675" cy="2947255"/>
+            <a:off x="3825369" y="880656"/>
+            <a:ext cx="3831892" cy="2873920"/>
           </a:xfrm>
           <a:prstGeom prst="rect">
             <a:avLst/>
@@ -8663,7 +8690,7 @@
       </p:sp>
       <p:pic>
         <p:nvPicPr>
-          <p:cNvPr id="8" name="图片 7" descr="图表, 散点图&#10;&#10;AI 生成的内容可能不正确。">
+          <p:cNvPr id="8" name="图片 7">
             <a:extLst>
               <a:ext uri="{FF2B5EF4-FFF2-40B4-BE49-F238E27FC236}">
                 <a16:creationId xmlns:a16="http://schemas.microsoft.com/office/drawing/2014/main" id="{5348FACD-0B79-38D1-A451-F5965E7C967D}"/>
@@ -8683,14 +8710,13 @@
               </a:ext>
             </a:extLst>
           </a:blip>
-          <a:stretch>
-            <a:fillRect/>
-          </a:stretch>
+          <a:srcRect/>
+          <a:stretch/>
         </p:blipFill>
         <p:spPr>
           <a:xfrm>
-            <a:off x="4016295" y="3779537"/>
-            <a:ext cx="3736697" cy="2802521"/>
+            <a:off x="4016296" y="3779537"/>
+            <a:ext cx="3736694" cy="2802521"/>
           </a:xfrm>
           <a:prstGeom prst="rect">
             <a:avLst/>
@@ -8699,10 +8725,10 @@
       </p:pic>
       <p:sp>
         <p:nvSpPr>
-          <p:cNvPr id="3" name="文本框 2">
-            <a:extLst>
-              <a:ext uri="{FF2B5EF4-FFF2-40B4-BE49-F238E27FC236}">
-                <a16:creationId xmlns:a16="http://schemas.microsoft.com/office/drawing/2014/main" id="{96BA27FB-D71C-98F4-5D3F-4045DC0D6B30}"/>
+          <p:cNvPr id="9" name="文本框 8">
+            <a:extLst>
+              <a:ext uri="{FF2B5EF4-FFF2-40B4-BE49-F238E27FC236}">
+                <a16:creationId xmlns:a16="http://schemas.microsoft.com/office/drawing/2014/main" id="{8EED32FB-E338-A20A-0BAD-BA0C2F45A277}"/>
               </a:ext>
             </a:extLst>
           </p:cNvPr>
@@ -8711,8 +8737,8 @@
         </p:nvSpPr>
         <p:spPr>
           <a:xfrm>
-            <a:off x="7752459" y="1201110"/>
-            <a:ext cx="4186537" cy="738664"/>
+            <a:off x="7890298" y="1485785"/>
+            <a:ext cx="3552127" cy="738664"/>
           </a:xfrm>
           <a:prstGeom prst="rect">
             <a:avLst/>
@@ -8882,7 +8908,7 @@
       </p:sp>
       <p:pic>
         <p:nvPicPr>
-          <p:cNvPr id="5" name="图片 4" descr="图表, 散点图&#10;&#10;AI 生成的内容可能不正确。">
+          <p:cNvPr id="5" name="图片 4">
             <a:extLst>
               <a:ext uri="{FF2B5EF4-FFF2-40B4-BE49-F238E27FC236}">
                 <a16:creationId xmlns:a16="http://schemas.microsoft.com/office/drawing/2014/main" id="{ADBEC60C-319C-5F6F-3518-9CDC4DC425F9}"/>
@@ -8902,10 +8928,8 @@
               </a:ext>
             </a:extLst>
           </a:blip>
-          <a:srcRect l="21" r="3" b="3"/>
-          <a:stretch>
-            <a:fillRect/>
-          </a:stretch>
+          <a:srcRect l="2152" r="2152"/>
+          <a:stretch/>
         </p:blipFill>
         <p:spPr>
           <a:xfrm>
@@ -8919,7 +8943,7 @@
       </p:pic>
       <p:pic>
         <p:nvPicPr>
-          <p:cNvPr id="9" name="图片 8" descr="图表, 散点图&#10;&#10;AI 生成的内容可能不正确。">
+          <p:cNvPr id="9" name="图片 8">
             <a:extLst>
               <a:ext uri="{FF2B5EF4-FFF2-40B4-BE49-F238E27FC236}">
                 <a16:creationId xmlns:a16="http://schemas.microsoft.com/office/drawing/2014/main" id="{4AB0C567-3439-F609-F862-5692FC9F355D}"/>
@@ -8939,10 +8963,8 @@
               </a:ext>
             </a:extLst>
           </a:blip>
-          <a:srcRect b="3553"/>
-          <a:stretch>
-            <a:fillRect/>
-          </a:stretch>
+          <a:srcRect t="1777" b="1777"/>
+          <a:stretch/>
         </p:blipFill>
         <p:spPr>
           <a:xfrm>
@@ -8956,7 +8978,7 @@
       </p:pic>
       <p:pic>
         <p:nvPicPr>
-          <p:cNvPr id="15" name="图片 14" descr="图表, 散点图&#10;&#10;AI 生成的内容可能不正确。">
+          <p:cNvPr id="15" name="图片 14">
             <a:extLst>
               <a:ext uri="{FF2B5EF4-FFF2-40B4-BE49-F238E27FC236}">
                 <a16:creationId xmlns:a16="http://schemas.microsoft.com/office/drawing/2014/main" id="{4C73AEB3-8276-133D-A7AA-2B15A2677895}"/>
@@ -8976,10 +8998,8 @@
               </a:ext>
             </a:extLst>
           </a:blip>
-          <a:srcRect b="3230"/>
-          <a:stretch>
-            <a:fillRect/>
-          </a:stretch>
+          <a:srcRect t="1615" b="1615"/>
+          <a:stretch/>
         </p:blipFill>
         <p:spPr>
           <a:xfrm>
@@ -8993,7 +9013,7 @@
       </p:pic>
       <p:pic>
         <p:nvPicPr>
-          <p:cNvPr id="20" name="图片 19" descr="图表, 散点图&#10;&#10;AI 生成的内容可能不正确。">
+          <p:cNvPr id="20" name="图片 19">
             <a:extLst>
               <a:ext uri="{FF2B5EF4-FFF2-40B4-BE49-F238E27FC236}">
                 <a16:creationId xmlns:a16="http://schemas.microsoft.com/office/drawing/2014/main" id="{3DDEB4AA-0FE6-AC75-0BA0-3A8B6ADE26B6}"/>
@@ -9013,14 +9033,13 @@
               </a:ext>
             </a:extLst>
           </a:blip>
-          <a:stretch>
-            <a:fillRect/>
-          </a:stretch>
+          <a:srcRect/>
+          <a:stretch/>
         </p:blipFill>
         <p:spPr>
           <a:xfrm>
-            <a:off x="3710763" y="3629106"/>
-            <a:ext cx="3914105" cy="2935579"/>
+            <a:off x="3777671" y="3629106"/>
+            <a:ext cx="3914104" cy="2935579"/>
           </a:xfrm>
           <a:prstGeom prst="rect">
             <a:avLst/>
@@ -9029,7 +9048,7 @@
       </p:pic>
       <p:pic>
         <p:nvPicPr>
-          <p:cNvPr id="22" name="图片 21" descr="图表, 散点图&#10;&#10;AI 生成的内容可能不正确。">
+          <p:cNvPr id="22" name="图片 21">
             <a:extLst>
               <a:ext uri="{FF2B5EF4-FFF2-40B4-BE49-F238E27FC236}">
                 <a16:creationId xmlns:a16="http://schemas.microsoft.com/office/drawing/2014/main" id="{F0EF470C-8A40-A347-5333-87CC8FE6A550}"/>
@@ -9049,14 +9068,13 @@
               </a:ext>
             </a:extLst>
           </a:blip>
-          <a:stretch>
-            <a:fillRect/>
-          </a:stretch>
+          <a:srcRect/>
+          <a:stretch/>
         </p:blipFill>
         <p:spPr>
           <a:xfrm>
             <a:off x="7758682" y="3629107"/>
-            <a:ext cx="3914105" cy="2935579"/>
+            <a:ext cx="3914104" cy="2935579"/>
           </a:xfrm>
           <a:prstGeom prst="rect">
             <a:avLst/>
@@ -9065,10 +9083,10 @@
       </p:pic>
       <p:sp>
         <p:nvSpPr>
-          <p:cNvPr id="3" name="文本框 2">
-            <a:extLst>
-              <a:ext uri="{FF2B5EF4-FFF2-40B4-BE49-F238E27FC236}">
-                <a16:creationId xmlns:a16="http://schemas.microsoft.com/office/drawing/2014/main" id="{DF605B47-1622-2C27-93F0-67BCC86023F3}"/>
+          <p:cNvPr id="4" name="文本框 3">
+            <a:extLst>
+              <a:ext uri="{FF2B5EF4-FFF2-40B4-BE49-F238E27FC236}">
+                <a16:creationId xmlns:a16="http://schemas.microsoft.com/office/drawing/2014/main" id="{FE82D0F6-6106-BE6C-E259-14439325F437}"/>
               </a:ext>
             </a:extLst>
           </p:cNvPr>
@@ -9077,8 +9095,8 @@
         </p:nvSpPr>
         <p:spPr>
           <a:xfrm>
-            <a:off x="7624868" y="1405477"/>
-            <a:ext cx="4186537" cy="738664"/>
+            <a:off x="7890298" y="1485785"/>
+            <a:ext cx="3552127" cy="738664"/>
           </a:xfrm>
           <a:prstGeom prst="rect">
             <a:avLst/>
@@ -9275,8 +9293,8 @@
         </p:blipFill>
         <p:spPr>
           <a:xfrm>
-            <a:off x="-33762" y="816894"/>
-            <a:ext cx="3868808" cy="2807890"/>
+            <a:off x="0" y="849760"/>
+            <a:ext cx="3882716" cy="2817984"/>
           </a:xfrm>
           <a:prstGeom prst="rect">
             <a:avLst/>
@@ -9310,8 +9328,8 @@
         </p:blipFill>
         <p:spPr>
           <a:xfrm>
-            <a:off x="3798229" y="3755723"/>
-            <a:ext cx="3757312" cy="2817984"/>
+            <a:off x="3835046" y="3755723"/>
+            <a:ext cx="3757311" cy="2817984"/>
           </a:xfrm>
           <a:prstGeom prst="rect">
             <a:avLst/>
@@ -9345,8 +9363,8 @@
         </p:blipFill>
         <p:spPr>
           <a:xfrm>
-            <a:off x="7704902" y="3755723"/>
-            <a:ext cx="3844794" cy="2883595"/>
+            <a:off x="7743965" y="3755723"/>
+            <a:ext cx="3844792" cy="2883595"/>
           </a:xfrm>
           <a:prstGeom prst="rect">
             <a:avLst/>
@@ -9355,10 +9373,10 @@
       </p:pic>
       <p:sp>
         <p:nvSpPr>
-          <p:cNvPr id="3" name="文本框 2">
-            <a:extLst>
-              <a:ext uri="{FF2B5EF4-FFF2-40B4-BE49-F238E27FC236}">
-                <a16:creationId xmlns:a16="http://schemas.microsoft.com/office/drawing/2014/main" id="{2B4B22D2-0CAC-59CA-2860-976DBD11A7C3}"/>
+          <p:cNvPr id="4" name="文本框 3">
+            <a:extLst>
+              <a:ext uri="{FF2B5EF4-FFF2-40B4-BE49-F238E27FC236}">
+                <a16:creationId xmlns:a16="http://schemas.microsoft.com/office/drawing/2014/main" id="{80660A0D-AD55-4630-8899-F1BABF3806A5}"/>
               </a:ext>
             </a:extLst>
           </p:cNvPr>
@@ -9367,8 +9385,8 @@
         </p:nvSpPr>
         <p:spPr>
           <a:xfrm>
-            <a:off x="7624868" y="1405477"/>
-            <a:ext cx="4186537" cy="738664"/>
+            <a:off x="7890298" y="1485785"/>
+            <a:ext cx="3552127" cy="738664"/>
           </a:xfrm>
           <a:prstGeom prst="rect">
             <a:avLst/>
@@ -9383,7 +9401,7 @@
           <a:p>
             <a:r>
               <a:rPr lang="en-US" altLang="zh-CN" sz="1400" b="1" dirty="0"/>
-              <a:t>Each point represents a state-level annual observation, pairing average precipitation with wheat yield for that year</a:t>
+              <a:t>Each point represents a state-level annual observation, pairing average precipitation with corn wheat for that year</a:t>
             </a:r>
             <a:endParaRPr lang="zh-CN" altLang="en-US" sz="1400" b="1" dirty="0"/>
           </a:p>

</xml_diff>